<commit_message>
Atualizando o desenho da GUI
Atualizando o desenho do dashboard.
Versao com radiobuttons e botão filtrar.
</commit_message>
<xml_diff>
--- a/wireframe/dashboard/tela_prototipo.pptx
+++ b/wireframe/dashboard/tela_prototipo.pptx
@@ -10,6 +10,10 @@
     <p:sldId id="258" r:id="rId4"/>
     <p:sldId id="259" r:id="rId5"/>
     <p:sldId id="260" r:id="rId6"/>
+    <p:sldId id="261" r:id="rId7"/>
+    <p:sldId id="262" r:id="rId8"/>
+    <p:sldId id="263" r:id="rId9"/>
+    <p:sldId id="264" r:id="rId10"/>
   </p:sldIdLst>
   <p:sldSz cx="12192000" cy="6858000"/>
   <p:notesSz cx="6858000" cy="9144000"/>
@@ -1002,7 +1006,7 @@
           <a:p>
             <a:fld id="{4CC36F32-6FF3-48D3-844D-5FFA5D5B6E5D}" type="datetimeFigureOut">
               <a:rPr lang="pt-BR" smtClean="0"/>
-              <a:t>25/02/2022</a:t>
+              <a:t>19/07/2022</a:t>
             </a:fld>
             <a:endParaRPr lang="pt-BR"/>
           </a:p>
@@ -1200,7 +1204,7 @@
           <a:p>
             <a:fld id="{4CC36F32-6FF3-48D3-844D-5FFA5D5B6E5D}" type="datetimeFigureOut">
               <a:rPr lang="pt-BR" smtClean="0"/>
-              <a:t>25/02/2022</a:t>
+              <a:t>19/07/2022</a:t>
             </a:fld>
             <a:endParaRPr lang="pt-BR"/>
           </a:p>
@@ -1408,7 +1412,7 @@
           <a:p>
             <a:fld id="{4CC36F32-6FF3-48D3-844D-5FFA5D5B6E5D}" type="datetimeFigureOut">
               <a:rPr lang="pt-BR" smtClean="0"/>
-              <a:t>25/02/2022</a:t>
+              <a:t>19/07/2022</a:t>
             </a:fld>
             <a:endParaRPr lang="pt-BR"/>
           </a:p>
@@ -1606,7 +1610,7 @@
           <a:p>
             <a:fld id="{4CC36F32-6FF3-48D3-844D-5FFA5D5B6E5D}" type="datetimeFigureOut">
               <a:rPr lang="pt-BR" smtClean="0"/>
-              <a:t>25/02/2022</a:t>
+              <a:t>19/07/2022</a:t>
             </a:fld>
             <a:endParaRPr lang="pt-BR"/>
           </a:p>
@@ -1881,7 +1885,7 @@
           <a:p>
             <a:fld id="{4CC36F32-6FF3-48D3-844D-5FFA5D5B6E5D}" type="datetimeFigureOut">
               <a:rPr lang="pt-BR" smtClean="0"/>
-              <a:t>25/02/2022</a:t>
+              <a:t>19/07/2022</a:t>
             </a:fld>
             <a:endParaRPr lang="pt-BR"/>
           </a:p>
@@ -2146,7 +2150,7 @@
           <a:p>
             <a:fld id="{4CC36F32-6FF3-48D3-844D-5FFA5D5B6E5D}" type="datetimeFigureOut">
               <a:rPr lang="pt-BR" smtClean="0"/>
-              <a:t>25/02/2022</a:t>
+              <a:t>19/07/2022</a:t>
             </a:fld>
             <a:endParaRPr lang="pt-BR"/>
           </a:p>
@@ -2558,7 +2562,7 @@
           <a:p>
             <a:fld id="{4CC36F32-6FF3-48D3-844D-5FFA5D5B6E5D}" type="datetimeFigureOut">
               <a:rPr lang="pt-BR" smtClean="0"/>
-              <a:t>25/02/2022</a:t>
+              <a:t>19/07/2022</a:t>
             </a:fld>
             <a:endParaRPr lang="pt-BR"/>
           </a:p>
@@ -2699,7 +2703,7 @@
           <a:p>
             <a:fld id="{4CC36F32-6FF3-48D3-844D-5FFA5D5B6E5D}" type="datetimeFigureOut">
               <a:rPr lang="pt-BR" smtClean="0"/>
-              <a:t>25/02/2022</a:t>
+              <a:t>19/07/2022</a:t>
             </a:fld>
             <a:endParaRPr lang="pt-BR"/>
           </a:p>
@@ -2812,7 +2816,7 @@
           <a:p>
             <a:fld id="{4CC36F32-6FF3-48D3-844D-5FFA5D5B6E5D}" type="datetimeFigureOut">
               <a:rPr lang="pt-BR" smtClean="0"/>
-              <a:t>25/02/2022</a:t>
+              <a:t>19/07/2022</a:t>
             </a:fld>
             <a:endParaRPr lang="pt-BR"/>
           </a:p>
@@ -3123,7 +3127,7 @@
           <a:p>
             <a:fld id="{4CC36F32-6FF3-48D3-844D-5FFA5D5B6E5D}" type="datetimeFigureOut">
               <a:rPr lang="pt-BR" smtClean="0"/>
-              <a:t>25/02/2022</a:t>
+              <a:t>19/07/2022</a:t>
             </a:fld>
             <a:endParaRPr lang="pt-BR"/>
           </a:p>
@@ -3411,7 +3415,7 @@
           <a:p>
             <a:fld id="{4CC36F32-6FF3-48D3-844D-5FFA5D5B6E5D}" type="datetimeFigureOut">
               <a:rPr lang="pt-BR" smtClean="0"/>
-              <a:t>25/02/2022</a:t>
+              <a:t>19/07/2022</a:t>
             </a:fld>
             <a:endParaRPr lang="pt-BR"/>
           </a:p>
@@ -3652,7 +3656,7 @@
           <a:p>
             <a:fld id="{4CC36F32-6FF3-48D3-844D-5FFA5D5B6E5D}" type="datetimeFigureOut">
               <a:rPr lang="pt-BR" smtClean="0"/>
-              <a:t>25/02/2022</a:t>
+              <a:t>19/07/2022</a:t>
             </a:fld>
             <a:endParaRPr lang="pt-BR"/>
           </a:p>
@@ -18514,6 +18518,2640 @@
 </p:sld>
 </file>
 
+<file path=ppt/slides/slide6.xml><?xml version="1.0" encoding="utf-8"?>
+<p:sld xmlns:a="http://schemas.openxmlformats.org/drawingml/2006/main" xmlns:r="http://schemas.openxmlformats.org/officeDocument/2006/relationships" xmlns:p="http://schemas.openxmlformats.org/presentationml/2006/main">
+  <p:cSld>
+    <p:spTree>
+      <p:nvGrpSpPr>
+        <p:cNvPr id="1" name=""/>
+        <p:cNvGrpSpPr/>
+        <p:nvPr/>
+      </p:nvGrpSpPr>
+      <p:grpSpPr>
+        <a:xfrm>
+          <a:off x="0" y="0"/>
+          <a:ext cx="0" cy="0"/>
+          <a:chOff x="0" y="0"/>
+          <a:chExt cx="0" cy="0"/>
+        </a:xfrm>
+      </p:grpSpPr>
+    </p:spTree>
+    <p:extLst>
+      <p:ext uri="{BB962C8B-B14F-4D97-AF65-F5344CB8AC3E}">
+        <p14:creationId xmlns:p14="http://schemas.microsoft.com/office/powerpoint/2010/main" val="390779581"/>
+      </p:ext>
+    </p:extLst>
+  </p:cSld>
+  <p:clrMapOvr>
+    <a:masterClrMapping/>
+  </p:clrMapOvr>
+</p:sld>
+</file>
+
+<file path=ppt/slides/slide7.xml><?xml version="1.0" encoding="utf-8"?>
+<p:sld xmlns:a="http://schemas.openxmlformats.org/drawingml/2006/main" xmlns:r="http://schemas.openxmlformats.org/officeDocument/2006/relationships" xmlns:p="http://schemas.openxmlformats.org/presentationml/2006/main">
+  <p:cSld>
+    <p:spTree>
+      <p:nvGrpSpPr>
+        <p:cNvPr id="1" name=""/>
+        <p:cNvGrpSpPr/>
+        <p:nvPr/>
+      </p:nvGrpSpPr>
+      <p:grpSpPr>
+        <a:xfrm>
+          <a:off x="0" y="0"/>
+          <a:ext cx="0" cy="0"/>
+          <a:chOff x="0" y="0"/>
+          <a:chExt cx="0" cy="0"/>
+        </a:xfrm>
+      </p:grpSpPr>
+      <p:sp>
+        <p:nvSpPr>
+          <p:cNvPr id="33" name="Retângulo 32">
+            <a:extLst>
+              <a:ext uri="{FF2B5EF4-FFF2-40B4-BE49-F238E27FC236}">
+                <a16:creationId xmlns:a16="http://schemas.microsoft.com/office/drawing/2014/main" id="{3ACF86DC-AC76-85F4-D538-48DDCD9EB06A}"/>
+              </a:ext>
+            </a:extLst>
+          </p:cNvPr>
+          <p:cNvSpPr/>
+          <p:nvPr/>
+        </p:nvSpPr>
+        <p:spPr>
+          <a:xfrm>
+            <a:off x="3472857" y="1220706"/>
+            <a:ext cx="798562" cy="185808"/>
+          </a:xfrm>
+          <a:prstGeom prst="rect">
+            <a:avLst/>
+          </a:prstGeom>
+          <a:solidFill>
+            <a:srgbClr val="E1E1E1"/>
+          </a:solidFill>
+          <a:ln>
+            <a:solidFill>
+              <a:srgbClr val="CACACA"/>
+            </a:solidFill>
+          </a:ln>
+          <a:effectLst>
+            <a:outerShdw blurRad="50800" dist="38100" dir="5400000" algn="t" rotWithShape="0">
+              <a:prstClr val="black">
+                <a:alpha val="40000"/>
+              </a:prstClr>
+            </a:outerShdw>
+          </a:effectLst>
+        </p:spPr>
+        <p:style>
+          <a:lnRef idx="2">
+            <a:schemeClr val="accent1">
+              <a:shade val="50000"/>
+            </a:schemeClr>
+          </a:lnRef>
+          <a:fillRef idx="1">
+            <a:schemeClr val="accent1"/>
+          </a:fillRef>
+          <a:effectRef idx="0">
+            <a:schemeClr val="accent1"/>
+          </a:effectRef>
+          <a:fontRef idx="minor">
+            <a:schemeClr val="lt1"/>
+          </a:fontRef>
+        </p:style>
+        <p:txBody>
+          <a:bodyPr rtlCol="0" anchor="ctr"/>
+          <a:lstStyle/>
+          <a:p>
+            <a:pPr algn="ctr"/>
+            <a:r>
+              <a:rPr lang="pt-BR" sz="1013" dirty="0">
+                <a:solidFill>
+                  <a:schemeClr val="tx1"/>
+                </a:solidFill>
+              </a:rPr>
+              <a:t>10</a:t>
+            </a:r>
+          </a:p>
+        </p:txBody>
+      </p:sp>
+      <p:sp>
+        <p:nvSpPr>
+          <p:cNvPr id="34" name="CaixaDeTexto 33">
+            <a:extLst>
+              <a:ext uri="{FF2B5EF4-FFF2-40B4-BE49-F238E27FC236}">
+                <a16:creationId xmlns:a16="http://schemas.microsoft.com/office/drawing/2014/main" id="{DC595E16-A2FA-65C4-ECFE-F446639B7F8D}"/>
+              </a:ext>
+            </a:extLst>
+          </p:cNvPr>
+          <p:cNvSpPr txBox="1"/>
+          <p:nvPr/>
+        </p:nvSpPr>
+        <p:spPr>
+          <a:xfrm>
+            <a:off x="2451195" y="1199046"/>
+            <a:ext cx="894974" cy="209160"/>
+          </a:xfrm>
+          <a:prstGeom prst="rect">
+            <a:avLst/>
+          </a:prstGeom>
+          <a:noFill/>
+        </p:spPr>
+        <p:txBody>
+          <a:bodyPr wrap="square" rtlCol="0">
+            <a:spAutoFit/>
+          </a:bodyPr>
+          <a:lstStyle>
+            <a:defPPr>
+              <a:defRPr lang="pt-BR"/>
+            </a:defPPr>
+            <a:lvl1pPr>
+              <a:defRPr sz="1400"/>
+            </a:lvl1pPr>
+          </a:lstStyle>
+          <a:p>
+            <a:r>
+              <a:rPr lang="pt-BR" sz="759" dirty="0"/>
+              <a:t>Quant animais:</a:t>
+            </a:r>
+          </a:p>
+        </p:txBody>
+      </p:sp>
+      <p:grpSp>
+        <p:nvGrpSpPr>
+          <p:cNvPr id="35" name="Agrupar 34">
+            <a:extLst>
+              <a:ext uri="{FF2B5EF4-FFF2-40B4-BE49-F238E27FC236}">
+                <a16:creationId xmlns:a16="http://schemas.microsoft.com/office/drawing/2014/main" id="{D1E51561-79CF-BC97-BBFD-EFCB649EBD91}"/>
+              </a:ext>
+            </a:extLst>
+          </p:cNvPr>
+          <p:cNvGrpSpPr/>
+          <p:nvPr/>
+        </p:nvGrpSpPr>
+        <p:grpSpPr>
+          <a:xfrm>
+            <a:off x="4194122" y="1264404"/>
+            <a:ext cx="39399" cy="36942"/>
+            <a:chOff x="8136641" y="4572000"/>
+            <a:chExt cx="1155141" cy="1044080"/>
+          </a:xfrm>
+        </p:grpSpPr>
+        <p:cxnSp>
+          <p:nvCxnSpPr>
+            <p:cNvPr id="36" name="Conector reto 35">
+              <a:extLst>
+                <a:ext uri="{FF2B5EF4-FFF2-40B4-BE49-F238E27FC236}">
+                  <a16:creationId xmlns:a16="http://schemas.microsoft.com/office/drawing/2014/main" id="{A47211E0-252B-180D-0C9B-CCB0CD550642}"/>
+                </a:ext>
+              </a:extLst>
+            </p:cNvPr>
+            <p:cNvCxnSpPr>
+              <a:cxnSpLocks/>
+            </p:cNvCxnSpPr>
+            <p:nvPr/>
+          </p:nvCxnSpPr>
+          <p:spPr>
+            <a:xfrm>
+              <a:off x="8731824" y="4572000"/>
+              <a:ext cx="559958" cy="1044080"/>
+            </a:xfrm>
+            <a:prstGeom prst="line">
+              <a:avLst/>
+            </a:prstGeom>
+            <a:ln>
+              <a:solidFill>
+                <a:schemeClr val="tx1"/>
+              </a:solidFill>
+            </a:ln>
+          </p:spPr>
+          <p:style>
+            <a:lnRef idx="1">
+              <a:schemeClr val="accent1"/>
+            </a:lnRef>
+            <a:fillRef idx="0">
+              <a:schemeClr val="accent1"/>
+            </a:fillRef>
+            <a:effectRef idx="0">
+              <a:schemeClr val="accent1"/>
+            </a:effectRef>
+            <a:fontRef idx="minor">
+              <a:schemeClr val="tx1"/>
+            </a:fontRef>
+          </p:style>
+        </p:cxnSp>
+        <p:cxnSp>
+          <p:nvCxnSpPr>
+            <p:cNvPr id="37" name="Conector reto 36">
+              <a:extLst>
+                <a:ext uri="{FF2B5EF4-FFF2-40B4-BE49-F238E27FC236}">
+                  <a16:creationId xmlns:a16="http://schemas.microsoft.com/office/drawing/2014/main" id="{A6F47C0C-7DB5-6937-7E41-A19D00A0F0DE}"/>
+                </a:ext>
+              </a:extLst>
+            </p:cNvPr>
+            <p:cNvCxnSpPr>
+              <a:cxnSpLocks/>
+            </p:cNvCxnSpPr>
+            <p:nvPr/>
+          </p:nvCxnSpPr>
+          <p:spPr>
+            <a:xfrm flipH="1">
+              <a:off x="8136641" y="4584366"/>
+              <a:ext cx="595183" cy="1031714"/>
+            </a:xfrm>
+            <a:prstGeom prst="line">
+              <a:avLst/>
+            </a:prstGeom>
+            <a:ln>
+              <a:solidFill>
+                <a:schemeClr val="tx1"/>
+              </a:solidFill>
+            </a:ln>
+          </p:spPr>
+          <p:style>
+            <a:lnRef idx="1">
+              <a:schemeClr val="accent1"/>
+            </a:lnRef>
+            <a:fillRef idx="0">
+              <a:schemeClr val="accent1"/>
+            </a:fillRef>
+            <a:effectRef idx="0">
+              <a:schemeClr val="accent1"/>
+            </a:effectRef>
+            <a:fontRef idx="minor">
+              <a:schemeClr val="tx1"/>
+            </a:fontRef>
+          </p:style>
+        </p:cxnSp>
+      </p:grpSp>
+      <p:sp>
+        <p:nvSpPr>
+          <p:cNvPr id="38" name="Retângulo 37">
+            <a:extLst>
+              <a:ext uri="{FF2B5EF4-FFF2-40B4-BE49-F238E27FC236}">
+                <a16:creationId xmlns:a16="http://schemas.microsoft.com/office/drawing/2014/main" id="{FFED6F38-D8AB-CD3B-E07A-762F400882DD}"/>
+              </a:ext>
+            </a:extLst>
+          </p:cNvPr>
+          <p:cNvSpPr/>
+          <p:nvPr/>
+        </p:nvSpPr>
+        <p:spPr>
+          <a:xfrm>
+            <a:off x="2587780" y="1707094"/>
+            <a:ext cx="595964" cy="488785"/>
+          </a:xfrm>
+          <a:prstGeom prst="rect">
+            <a:avLst/>
+          </a:prstGeom>
+          <a:solidFill>
+            <a:srgbClr val="1F77B4"/>
+          </a:solidFill>
+          <a:ln>
+            <a:solidFill>
+              <a:srgbClr val="CACACA"/>
+            </a:solidFill>
+          </a:ln>
+          <a:effectLst>
+            <a:outerShdw blurRad="50800" dist="38100" dir="5400000" algn="t" rotWithShape="0">
+              <a:prstClr val="black">
+                <a:alpha val="40000"/>
+              </a:prstClr>
+            </a:outerShdw>
+          </a:effectLst>
+        </p:spPr>
+        <p:style>
+          <a:lnRef idx="2">
+            <a:schemeClr val="accent1">
+              <a:shade val="50000"/>
+            </a:schemeClr>
+          </a:lnRef>
+          <a:fillRef idx="1">
+            <a:schemeClr val="accent1"/>
+          </a:fillRef>
+          <a:effectRef idx="0">
+            <a:schemeClr val="accent1"/>
+          </a:effectRef>
+          <a:fontRef idx="minor">
+            <a:schemeClr val="lt1"/>
+          </a:fontRef>
+        </p:style>
+        <p:txBody>
+          <a:bodyPr rtlCol="0" anchor="ctr"/>
+          <a:lstStyle/>
+          <a:p>
+            <a:pPr algn="ctr"/>
+            <a:r>
+              <a:rPr lang="pt-BR" sz="633" dirty="0">
+                <a:solidFill>
+                  <a:schemeClr val="tx1"/>
+                </a:solidFill>
+              </a:rPr>
+              <a:t>DEP_PE_365: Max - Min</a:t>
+            </a:r>
+          </a:p>
+        </p:txBody>
+      </p:sp>
+      <p:grpSp>
+        <p:nvGrpSpPr>
+          <p:cNvPr id="39" name="Agrupar 38">
+            <a:extLst>
+              <a:ext uri="{FF2B5EF4-FFF2-40B4-BE49-F238E27FC236}">
+                <a16:creationId xmlns:a16="http://schemas.microsoft.com/office/drawing/2014/main" id="{1F3AE3C7-E3B8-2D53-D79C-5144DD1E2581}"/>
+              </a:ext>
+            </a:extLst>
+          </p:cNvPr>
+          <p:cNvGrpSpPr/>
+          <p:nvPr/>
+        </p:nvGrpSpPr>
+        <p:grpSpPr>
+          <a:xfrm rot="10800000">
+            <a:off x="4194122" y="1320862"/>
+            <a:ext cx="39399" cy="36942"/>
+            <a:chOff x="8136641" y="4572000"/>
+            <a:chExt cx="1155141" cy="1044080"/>
+          </a:xfrm>
+        </p:grpSpPr>
+        <p:cxnSp>
+          <p:nvCxnSpPr>
+            <p:cNvPr id="40" name="Conector reto 39">
+              <a:extLst>
+                <a:ext uri="{FF2B5EF4-FFF2-40B4-BE49-F238E27FC236}">
+                  <a16:creationId xmlns:a16="http://schemas.microsoft.com/office/drawing/2014/main" id="{AFEB5656-556C-1C47-DFEC-5F9C219F693A}"/>
+                </a:ext>
+              </a:extLst>
+            </p:cNvPr>
+            <p:cNvCxnSpPr>
+              <a:cxnSpLocks/>
+            </p:cNvCxnSpPr>
+            <p:nvPr/>
+          </p:nvCxnSpPr>
+          <p:spPr>
+            <a:xfrm>
+              <a:off x="8731824" y="4572000"/>
+              <a:ext cx="559958" cy="1044080"/>
+            </a:xfrm>
+            <a:prstGeom prst="line">
+              <a:avLst/>
+            </a:prstGeom>
+            <a:ln>
+              <a:solidFill>
+                <a:schemeClr val="tx1"/>
+              </a:solidFill>
+            </a:ln>
+          </p:spPr>
+          <p:style>
+            <a:lnRef idx="1">
+              <a:schemeClr val="accent1"/>
+            </a:lnRef>
+            <a:fillRef idx="0">
+              <a:schemeClr val="accent1"/>
+            </a:fillRef>
+            <a:effectRef idx="0">
+              <a:schemeClr val="accent1"/>
+            </a:effectRef>
+            <a:fontRef idx="minor">
+              <a:schemeClr val="tx1"/>
+            </a:fontRef>
+          </p:style>
+        </p:cxnSp>
+        <p:cxnSp>
+          <p:nvCxnSpPr>
+            <p:cNvPr id="41" name="Conector reto 40">
+              <a:extLst>
+                <a:ext uri="{FF2B5EF4-FFF2-40B4-BE49-F238E27FC236}">
+                  <a16:creationId xmlns:a16="http://schemas.microsoft.com/office/drawing/2014/main" id="{EC9692C0-6D52-6DDF-9817-0F4F06A35150}"/>
+                </a:ext>
+              </a:extLst>
+            </p:cNvPr>
+            <p:cNvCxnSpPr>
+              <a:cxnSpLocks/>
+            </p:cNvCxnSpPr>
+            <p:nvPr/>
+          </p:nvCxnSpPr>
+          <p:spPr>
+            <a:xfrm flipH="1">
+              <a:off x="8136641" y="4584366"/>
+              <a:ext cx="595183" cy="1031714"/>
+            </a:xfrm>
+            <a:prstGeom prst="line">
+              <a:avLst/>
+            </a:prstGeom>
+            <a:ln>
+              <a:solidFill>
+                <a:schemeClr val="tx1"/>
+              </a:solidFill>
+            </a:ln>
+          </p:spPr>
+          <p:style>
+            <a:lnRef idx="1">
+              <a:schemeClr val="accent1"/>
+            </a:lnRef>
+            <a:fillRef idx="0">
+              <a:schemeClr val="accent1"/>
+            </a:fillRef>
+            <a:effectRef idx="0">
+              <a:schemeClr val="accent1"/>
+            </a:effectRef>
+            <a:fontRef idx="minor">
+              <a:schemeClr val="tx1"/>
+            </a:fontRef>
+          </p:style>
+        </p:cxnSp>
+      </p:grpSp>
+      <p:sp>
+        <p:nvSpPr>
+          <p:cNvPr id="42" name="Retângulo 41">
+            <a:extLst>
+              <a:ext uri="{FF2B5EF4-FFF2-40B4-BE49-F238E27FC236}">
+                <a16:creationId xmlns:a16="http://schemas.microsoft.com/office/drawing/2014/main" id="{0A82667E-4733-A63D-15AD-2E475E867189}"/>
+              </a:ext>
+            </a:extLst>
+          </p:cNvPr>
+          <p:cNvSpPr/>
+          <p:nvPr/>
+        </p:nvSpPr>
+        <p:spPr>
+          <a:xfrm>
+            <a:off x="3812656" y="1715838"/>
+            <a:ext cx="596437" cy="488785"/>
+          </a:xfrm>
+          <a:prstGeom prst="rect">
+            <a:avLst/>
+          </a:prstGeom>
+          <a:solidFill>
+            <a:srgbClr val="FF7F0E"/>
+          </a:solidFill>
+          <a:ln>
+            <a:solidFill>
+              <a:srgbClr val="CACACA"/>
+            </a:solidFill>
+          </a:ln>
+          <a:effectLst>
+            <a:outerShdw blurRad="50800" dist="38100" dir="5400000" algn="t" rotWithShape="0">
+              <a:prstClr val="black">
+                <a:alpha val="40000"/>
+              </a:prstClr>
+            </a:outerShdw>
+          </a:effectLst>
+        </p:spPr>
+        <p:style>
+          <a:lnRef idx="2">
+            <a:schemeClr val="accent1">
+              <a:shade val="50000"/>
+            </a:schemeClr>
+          </a:lnRef>
+          <a:fillRef idx="1">
+            <a:schemeClr val="accent1"/>
+          </a:fillRef>
+          <a:effectRef idx="0">
+            <a:schemeClr val="accent1"/>
+          </a:effectRef>
+          <a:fontRef idx="minor">
+            <a:schemeClr val="lt1"/>
+          </a:fontRef>
+        </p:style>
+        <p:txBody>
+          <a:bodyPr rtlCol="0" anchor="ctr"/>
+          <a:lstStyle/>
+          <a:p>
+            <a:pPr algn="ctr"/>
+            <a:r>
+              <a:rPr lang="pt-BR" sz="633" dirty="0">
+                <a:solidFill>
+                  <a:schemeClr val="tx1"/>
+                </a:solidFill>
+              </a:rPr>
+              <a:t>DEP_PE_450: Max - Min</a:t>
+            </a:r>
+          </a:p>
+        </p:txBody>
+      </p:sp>
+      <p:sp>
+        <p:nvSpPr>
+          <p:cNvPr id="43" name="Retângulo 42">
+            <a:extLst>
+              <a:ext uri="{FF2B5EF4-FFF2-40B4-BE49-F238E27FC236}">
+                <a16:creationId xmlns:a16="http://schemas.microsoft.com/office/drawing/2014/main" id="{784C8097-AC4A-B9C0-D194-F38F006788A0}"/>
+              </a:ext>
+            </a:extLst>
+          </p:cNvPr>
+          <p:cNvSpPr/>
+          <p:nvPr/>
+        </p:nvSpPr>
+        <p:spPr>
+          <a:xfrm>
+            <a:off x="5082317" y="1736236"/>
+            <a:ext cx="596437" cy="488787"/>
+          </a:xfrm>
+          <a:prstGeom prst="rect">
+            <a:avLst/>
+          </a:prstGeom>
+          <a:solidFill>
+            <a:srgbClr val="2CA02C"/>
+          </a:solidFill>
+          <a:ln>
+            <a:solidFill>
+              <a:srgbClr val="CACACA"/>
+            </a:solidFill>
+          </a:ln>
+          <a:effectLst>
+            <a:outerShdw blurRad="50800" dist="38100" dir="5400000" algn="t" rotWithShape="0">
+              <a:prstClr val="black">
+                <a:alpha val="40000"/>
+              </a:prstClr>
+            </a:outerShdw>
+          </a:effectLst>
+        </p:spPr>
+        <p:style>
+          <a:lnRef idx="2">
+            <a:schemeClr val="accent1">
+              <a:shade val="50000"/>
+            </a:schemeClr>
+          </a:lnRef>
+          <a:fillRef idx="1">
+            <a:schemeClr val="accent1"/>
+          </a:fillRef>
+          <a:effectRef idx="0">
+            <a:schemeClr val="accent1"/>
+          </a:effectRef>
+          <a:fontRef idx="minor">
+            <a:schemeClr val="lt1"/>
+          </a:fontRef>
+        </p:style>
+        <p:txBody>
+          <a:bodyPr rtlCol="0" anchor="ctr"/>
+          <a:lstStyle/>
+          <a:p>
+            <a:pPr algn="ctr"/>
+            <a:r>
+              <a:rPr lang="pt-BR" sz="633" dirty="0">
+                <a:solidFill>
+                  <a:schemeClr val="tx1"/>
+                </a:solidFill>
+              </a:rPr>
+              <a:t>DEP_E: Max - Min</a:t>
+            </a:r>
+          </a:p>
+        </p:txBody>
+      </p:sp>
+      <p:sp>
+        <p:nvSpPr>
+          <p:cNvPr id="44" name="Retângulo 43">
+            <a:extLst>
+              <a:ext uri="{FF2B5EF4-FFF2-40B4-BE49-F238E27FC236}">
+                <a16:creationId xmlns:a16="http://schemas.microsoft.com/office/drawing/2014/main" id="{A0571FEB-B07E-791D-98D9-1F324A8ACCEC}"/>
+              </a:ext>
+            </a:extLst>
+          </p:cNvPr>
+          <p:cNvSpPr/>
+          <p:nvPr/>
+        </p:nvSpPr>
+        <p:spPr>
+          <a:xfrm>
+            <a:off x="6398484" y="1730719"/>
+            <a:ext cx="596437" cy="483697"/>
+          </a:xfrm>
+          <a:prstGeom prst="rect">
+            <a:avLst/>
+          </a:prstGeom>
+          <a:solidFill>
+            <a:srgbClr val="D62728"/>
+          </a:solidFill>
+          <a:ln>
+            <a:solidFill>
+              <a:srgbClr val="CACACA"/>
+            </a:solidFill>
+          </a:ln>
+          <a:effectLst>
+            <a:outerShdw blurRad="50800" dist="38100" dir="5400000" algn="t" rotWithShape="0">
+              <a:prstClr val="black">
+                <a:alpha val="40000"/>
+              </a:prstClr>
+            </a:outerShdw>
+          </a:effectLst>
+        </p:spPr>
+        <p:style>
+          <a:lnRef idx="2">
+            <a:schemeClr val="accent1">
+              <a:shade val="50000"/>
+            </a:schemeClr>
+          </a:lnRef>
+          <a:fillRef idx="1">
+            <a:schemeClr val="accent1"/>
+          </a:fillRef>
+          <a:effectRef idx="0">
+            <a:schemeClr val="accent1"/>
+          </a:effectRef>
+          <a:fontRef idx="minor">
+            <a:schemeClr val="lt1"/>
+          </a:fontRef>
+        </p:style>
+        <p:txBody>
+          <a:bodyPr rtlCol="0" anchor="ctr"/>
+          <a:lstStyle/>
+          <a:p>
+            <a:pPr algn="ctr"/>
+            <a:r>
+              <a:rPr lang="pt-BR" sz="633" dirty="0">
+                <a:solidFill>
+                  <a:schemeClr val="tx1"/>
+                </a:solidFill>
+              </a:rPr>
+              <a:t>DEP_M: Max - Min</a:t>
+            </a:r>
+          </a:p>
+        </p:txBody>
+      </p:sp>
+      <p:sp>
+        <p:nvSpPr>
+          <p:cNvPr id="45" name="Retângulo 44">
+            <a:extLst>
+              <a:ext uri="{FF2B5EF4-FFF2-40B4-BE49-F238E27FC236}">
+                <a16:creationId xmlns:a16="http://schemas.microsoft.com/office/drawing/2014/main" id="{9FAA9DD8-D928-79D9-96D0-0A0A0DC79D8B}"/>
+              </a:ext>
+            </a:extLst>
+          </p:cNvPr>
+          <p:cNvSpPr/>
+          <p:nvPr/>
+        </p:nvSpPr>
+        <p:spPr>
+          <a:xfrm>
+            <a:off x="7695729" y="1722562"/>
+            <a:ext cx="596437" cy="475337"/>
+          </a:xfrm>
+          <a:prstGeom prst="rect">
+            <a:avLst/>
+          </a:prstGeom>
+          <a:solidFill>
+            <a:srgbClr val="9467BD"/>
+          </a:solidFill>
+          <a:ln>
+            <a:solidFill>
+              <a:srgbClr val="CACACA"/>
+            </a:solidFill>
+          </a:ln>
+          <a:effectLst>
+            <a:outerShdw blurRad="50800" dist="38100" dir="5400000" algn="t" rotWithShape="0">
+              <a:prstClr val="black">
+                <a:alpha val="40000"/>
+              </a:prstClr>
+            </a:outerShdw>
+          </a:effectLst>
+        </p:spPr>
+        <p:style>
+          <a:lnRef idx="2">
+            <a:schemeClr val="accent1">
+              <a:shade val="50000"/>
+            </a:schemeClr>
+          </a:lnRef>
+          <a:fillRef idx="1">
+            <a:schemeClr val="accent1"/>
+          </a:fillRef>
+          <a:effectRef idx="0">
+            <a:schemeClr val="accent1"/>
+          </a:effectRef>
+          <a:fontRef idx="minor">
+            <a:schemeClr val="lt1"/>
+          </a:fontRef>
+        </p:style>
+        <p:txBody>
+          <a:bodyPr rtlCol="0" anchor="ctr"/>
+          <a:lstStyle/>
+          <a:p>
+            <a:pPr algn="ctr"/>
+            <a:r>
+              <a:rPr lang="pt-BR" sz="633" dirty="0">
+                <a:solidFill>
+                  <a:schemeClr val="tx1"/>
+                </a:solidFill>
+              </a:rPr>
+              <a:t>DEP_P: Max - Min</a:t>
+            </a:r>
+          </a:p>
+        </p:txBody>
+      </p:sp>
+      <p:sp>
+        <p:nvSpPr>
+          <p:cNvPr id="46" name="Retângulo 45">
+            <a:extLst>
+              <a:ext uri="{FF2B5EF4-FFF2-40B4-BE49-F238E27FC236}">
+                <a16:creationId xmlns:a16="http://schemas.microsoft.com/office/drawing/2014/main" id="{FA29CE8C-E394-A6AB-0DA3-152E354C2B3B}"/>
+              </a:ext>
+            </a:extLst>
+          </p:cNvPr>
+          <p:cNvSpPr/>
+          <p:nvPr/>
+        </p:nvSpPr>
+        <p:spPr>
+          <a:xfrm>
+            <a:off x="8992972" y="1702574"/>
+            <a:ext cx="595963" cy="475337"/>
+          </a:xfrm>
+          <a:prstGeom prst="rect">
+            <a:avLst/>
+          </a:prstGeom>
+          <a:solidFill>
+            <a:srgbClr val="8C564B"/>
+          </a:solidFill>
+          <a:ln>
+            <a:solidFill>
+              <a:srgbClr val="CACACA"/>
+            </a:solidFill>
+          </a:ln>
+          <a:effectLst>
+            <a:outerShdw blurRad="50800" dist="38100" dir="5400000" algn="t" rotWithShape="0">
+              <a:prstClr val="black">
+                <a:alpha val="40000"/>
+              </a:prstClr>
+            </a:outerShdw>
+          </a:effectLst>
+        </p:spPr>
+        <p:style>
+          <a:lnRef idx="2">
+            <a:schemeClr val="accent1">
+              <a:shade val="50000"/>
+            </a:schemeClr>
+          </a:lnRef>
+          <a:fillRef idx="1">
+            <a:schemeClr val="accent1"/>
+          </a:fillRef>
+          <a:effectRef idx="0">
+            <a:schemeClr val="accent1"/>
+          </a:effectRef>
+          <a:fontRef idx="minor">
+            <a:schemeClr val="lt1"/>
+          </a:fontRef>
+        </p:style>
+        <p:txBody>
+          <a:bodyPr rtlCol="0" anchor="ctr"/>
+          <a:lstStyle/>
+          <a:p>
+            <a:pPr algn="ctr"/>
+            <a:r>
+              <a:rPr lang="pt-BR" sz="633" dirty="0">
+                <a:solidFill>
+                  <a:schemeClr val="tx1"/>
+                </a:solidFill>
+              </a:rPr>
+              <a:t>DEP_STAY: Max - Min</a:t>
+            </a:r>
+          </a:p>
+        </p:txBody>
+      </p:sp>
+      <p:pic>
+        <p:nvPicPr>
+          <p:cNvPr id="49" name="Imagem 48">
+            <a:extLst>
+              <a:ext uri="{FF2B5EF4-FFF2-40B4-BE49-F238E27FC236}">
+                <a16:creationId xmlns:a16="http://schemas.microsoft.com/office/drawing/2014/main" id="{9533005A-4E9B-9675-D519-E0AC85535F0E}"/>
+              </a:ext>
+            </a:extLst>
+          </p:cNvPr>
+          <p:cNvPicPr>
+            <a:picLocks noChangeAspect="1"/>
+          </p:cNvPicPr>
+          <p:nvPr/>
+        </p:nvPicPr>
+        <p:blipFill>
+          <a:blip r:embed="rId2"/>
+          <a:stretch>
+            <a:fillRect/>
+          </a:stretch>
+        </p:blipFill>
+        <p:spPr>
+          <a:xfrm>
+            <a:off x="2481134" y="395986"/>
+            <a:ext cx="7229735" cy="647894"/>
+          </a:xfrm>
+          <a:prstGeom prst="rect">
+            <a:avLst/>
+          </a:prstGeom>
+        </p:spPr>
+      </p:pic>
+      <p:pic>
+        <p:nvPicPr>
+          <p:cNvPr id="51" name="Imagem 50">
+            <a:extLst>
+              <a:ext uri="{FF2B5EF4-FFF2-40B4-BE49-F238E27FC236}">
+                <a16:creationId xmlns:a16="http://schemas.microsoft.com/office/drawing/2014/main" id="{1981CABB-6258-FD87-F97D-354F5CAD1DC4}"/>
+              </a:ext>
+            </a:extLst>
+          </p:cNvPr>
+          <p:cNvPicPr>
+            <a:picLocks noChangeAspect="1"/>
+          </p:cNvPicPr>
+          <p:nvPr/>
+        </p:nvPicPr>
+        <p:blipFill>
+          <a:blip r:embed="rId3"/>
+          <a:stretch>
+            <a:fillRect/>
+          </a:stretch>
+        </p:blipFill>
+        <p:spPr>
+          <a:xfrm>
+            <a:off x="2498001" y="2369581"/>
+            <a:ext cx="7229735" cy="1400285"/>
+          </a:xfrm>
+          <a:prstGeom prst="rect">
+            <a:avLst/>
+          </a:prstGeom>
+        </p:spPr>
+      </p:pic>
+      <p:pic>
+        <p:nvPicPr>
+          <p:cNvPr id="53" name="Imagem 52">
+            <a:extLst>
+              <a:ext uri="{FF2B5EF4-FFF2-40B4-BE49-F238E27FC236}">
+                <a16:creationId xmlns:a16="http://schemas.microsoft.com/office/drawing/2014/main" id="{2FD4C93E-6196-58C9-0AA0-E72006EE5297}"/>
+              </a:ext>
+            </a:extLst>
+          </p:cNvPr>
+          <p:cNvPicPr>
+            <a:picLocks noChangeAspect="1"/>
+          </p:cNvPicPr>
+          <p:nvPr/>
+        </p:nvPicPr>
+        <p:blipFill>
+          <a:blip r:embed="rId4"/>
+          <a:stretch>
+            <a:fillRect/>
+          </a:stretch>
+        </p:blipFill>
+        <p:spPr>
+          <a:xfrm>
+            <a:off x="2490188" y="3914426"/>
+            <a:ext cx="7229735" cy="1146364"/>
+          </a:xfrm>
+          <a:prstGeom prst="rect">
+            <a:avLst/>
+          </a:prstGeom>
+        </p:spPr>
+      </p:pic>
+    </p:spTree>
+    <p:extLst>
+      <p:ext uri="{BB962C8B-B14F-4D97-AF65-F5344CB8AC3E}">
+        <p14:creationId xmlns:p14="http://schemas.microsoft.com/office/powerpoint/2010/main" val="3768140671"/>
+      </p:ext>
+    </p:extLst>
+  </p:cSld>
+  <p:clrMapOvr>
+    <a:masterClrMapping/>
+  </p:clrMapOvr>
+</p:sld>
+</file>
+
+<file path=ppt/slides/slide8.xml><?xml version="1.0" encoding="utf-8"?>
+<p:sld xmlns:a="http://schemas.openxmlformats.org/drawingml/2006/main" xmlns:r="http://schemas.openxmlformats.org/officeDocument/2006/relationships" xmlns:p="http://schemas.openxmlformats.org/presentationml/2006/main">
+  <p:cSld>
+    <p:spTree>
+      <p:nvGrpSpPr>
+        <p:cNvPr id="1" name=""/>
+        <p:cNvGrpSpPr/>
+        <p:nvPr/>
+      </p:nvGrpSpPr>
+      <p:grpSpPr>
+        <a:xfrm>
+          <a:off x="0" y="0"/>
+          <a:ext cx="0" cy="0"/>
+          <a:chOff x="0" y="0"/>
+          <a:chExt cx="0" cy="0"/>
+        </a:xfrm>
+      </p:grpSpPr>
+      <p:sp>
+        <p:nvSpPr>
+          <p:cNvPr id="38" name="Retângulo 37">
+            <a:extLst>
+              <a:ext uri="{FF2B5EF4-FFF2-40B4-BE49-F238E27FC236}">
+                <a16:creationId xmlns:a16="http://schemas.microsoft.com/office/drawing/2014/main" id="{FFED6F38-D8AB-CD3B-E07A-762F400882DD}"/>
+              </a:ext>
+            </a:extLst>
+          </p:cNvPr>
+          <p:cNvSpPr/>
+          <p:nvPr/>
+        </p:nvSpPr>
+        <p:spPr>
+          <a:xfrm>
+            <a:off x="2543468" y="1139621"/>
+            <a:ext cx="595964" cy="488785"/>
+          </a:xfrm>
+          <a:prstGeom prst="rect">
+            <a:avLst/>
+          </a:prstGeom>
+          <a:solidFill>
+            <a:srgbClr val="1F77B4"/>
+          </a:solidFill>
+          <a:ln>
+            <a:solidFill>
+              <a:srgbClr val="CACACA"/>
+            </a:solidFill>
+          </a:ln>
+          <a:effectLst>
+            <a:outerShdw blurRad="50800" dist="38100" dir="5400000" algn="t" rotWithShape="0">
+              <a:prstClr val="black">
+                <a:alpha val="40000"/>
+              </a:prstClr>
+            </a:outerShdw>
+          </a:effectLst>
+        </p:spPr>
+        <p:style>
+          <a:lnRef idx="2">
+            <a:schemeClr val="accent1">
+              <a:shade val="50000"/>
+            </a:schemeClr>
+          </a:lnRef>
+          <a:fillRef idx="1">
+            <a:schemeClr val="accent1"/>
+          </a:fillRef>
+          <a:effectRef idx="0">
+            <a:schemeClr val="accent1"/>
+          </a:effectRef>
+          <a:fontRef idx="minor">
+            <a:schemeClr val="lt1"/>
+          </a:fontRef>
+        </p:style>
+        <p:txBody>
+          <a:bodyPr rtlCol="0" anchor="ctr"/>
+          <a:lstStyle/>
+          <a:p>
+            <a:pPr algn="ctr"/>
+            <a:r>
+              <a:rPr lang="pt-BR" sz="633" dirty="0">
+                <a:solidFill>
+                  <a:schemeClr val="tx1"/>
+                </a:solidFill>
+              </a:rPr>
+              <a:t>DEP_PE_365: Max - Min</a:t>
+            </a:r>
+          </a:p>
+        </p:txBody>
+      </p:sp>
+      <p:sp>
+        <p:nvSpPr>
+          <p:cNvPr id="42" name="Retângulo 41">
+            <a:extLst>
+              <a:ext uri="{FF2B5EF4-FFF2-40B4-BE49-F238E27FC236}">
+                <a16:creationId xmlns:a16="http://schemas.microsoft.com/office/drawing/2014/main" id="{0A82667E-4733-A63D-15AD-2E475E867189}"/>
+              </a:ext>
+            </a:extLst>
+          </p:cNvPr>
+          <p:cNvSpPr/>
+          <p:nvPr/>
+        </p:nvSpPr>
+        <p:spPr>
+          <a:xfrm>
+            <a:off x="3699082" y="1163246"/>
+            <a:ext cx="596437" cy="488785"/>
+          </a:xfrm>
+          <a:prstGeom prst="rect">
+            <a:avLst/>
+          </a:prstGeom>
+          <a:solidFill>
+            <a:srgbClr val="FF7F0E"/>
+          </a:solidFill>
+          <a:ln>
+            <a:solidFill>
+              <a:srgbClr val="CACACA"/>
+            </a:solidFill>
+          </a:ln>
+          <a:effectLst>
+            <a:outerShdw blurRad="50800" dist="38100" dir="5400000" algn="t" rotWithShape="0">
+              <a:prstClr val="black">
+                <a:alpha val="40000"/>
+              </a:prstClr>
+            </a:outerShdw>
+          </a:effectLst>
+        </p:spPr>
+        <p:style>
+          <a:lnRef idx="2">
+            <a:schemeClr val="accent1">
+              <a:shade val="50000"/>
+            </a:schemeClr>
+          </a:lnRef>
+          <a:fillRef idx="1">
+            <a:schemeClr val="accent1"/>
+          </a:fillRef>
+          <a:effectRef idx="0">
+            <a:schemeClr val="accent1"/>
+          </a:effectRef>
+          <a:fontRef idx="minor">
+            <a:schemeClr val="lt1"/>
+          </a:fontRef>
+        </p:style>
+        <p:txBody>
+          <a:bodyPr rtlCol="0" anchor="ctr"/>
+          <a:lstStyle/>
+          <a:p>
+            <a:pPr algn="ctr"/>
+            <a:r>
+              <a:rPr lang="pt-BR" sz="633" dirty="0">
+                <a:solidFill>
+                  <a:schemeClr val="tx1"/>
+                </a:solidFill>
+              </a:rPr>
+              <a:t>DEP_PE_450: Max - Min</a:t>
+            </a:r>
+          </a:p>
+        </p:txBody>
+      </p:sp>
+      <p:sp>
+        <p:nvSpPr>
+          <p:cNvPr id="43" name="Retângulo 42">
+            <a:extLst>
+              <a:ext uri="{FF2B5EF4-FFF2-40B4-BE49-F238E27FC236}">
+                <a16:creationId xmlns:a16="http://schemas.microsoft.com/office/drawing/2014/main" id="{784C8097-AC4A-B9C0-D194-F38F006788A0}"/>
+              </a:ext>
+            </a:extLst>
+          </p:cNvPr>
+          <p:cNvSpPr/>
+          <p:nvPr/>
+        </p:nvSpPr>
+        <p:spPr>
+          <a:xfrm>
+            <a:off x="5038005" y="1168763"/>
+            <a:ext cx="596437" cy="488787"/>
+          </a:xfrm>
+          <a:prstGeom prst="rect">
+            <a:avLst/>
+          </a:prstGeom>
+          <a:solidFill>
+            <a:srgbClr val="2CA02C"/>
+          </a:solidFill>
+          <a:ln>
+            <a:solidFill>
+              <a:srgbClr val="CACACA"/>
+            </a:solidFill>
+          </a:ln>
+          <a:effectLst>
+            <a:outerShdw blurRad="50800" dist="38100" dir="5400000" algn="t" rotWithShape="0">
+              <a:prstClr val="black">
+                <a:alpha val="40000"/>
+              </a:prstClr>
+            </a:outerShdw>
+          </a:effectLst>
+        </p:spPr>
+        <p:style>
+          <a:lnRef idx="2">
+            <a:schemeClr val="accent1">
+              <a:shade val="50000"/>
+            </a:schemeClr>
+          </a:lnRef>
+          <a:fillRef idx="1">
+            <a:schemeClr val="accent1"/>
+          </a:fillRef>
+          <a:effectRef idx="0">
+            <a:schemeClr val="accent1"/>
+          </a:effectRef>
+          <a:fontRef idx="minor">
+            <a:schemeClr val="lt1"/>
+          </a:fontRef>
+        </p:style>
+        <p:txBody>
+          <a:bodyPr rtlCol="0" anchor="ctr"/>
+          <a:lstStyle/>
+          <a:p>
+            <a:pPr algn="ctr"/>
+            <a:r>
+              <a:rPr lang="pt-BR" sz="633" dirty="0">
+                <a:solidFill>
+                  <a:schemeClr val="tx1"/>
+                </a:solidFill>
+              </a:rPr>
+              <a:t>DEP_E: Max - Min</a:t>
+            </a:r>
+          </a:p>
+        </p:txBody>
+      </p:sp>
+      <p:sp>
+        <p:nvSpPr>
+          <p:cNvPr id="44" name="Retângulo 43">
+            <a:extLst>
+              <a:ext uri="{FF2B5EF4-FFF2-40B4-BE49-F238E27FC236}">
+                <a16:creationId xmlns:a16="http://schemas.microsoft.com/office/drawing/2014/main" id="{A0571FEB-B07E-791D-98D9-1F324A8ACCEC}"/>
+              </a:ext>
+            </a:extLst>
+          </p:cNvPr>
+          <p:cNvSpPr/>
+          <p:nvPr/>
+        </p:nvSpPr>
+        <p:spPr>
+          <a:xfrm>
+            <a:off x="6354172" y="1163246"/>
+            <a:ext cx="596437" cy="483697"/>
+          </a:xfrm>
+          <a:prstGeom prst="rect">
+            <a:avLst/>
+          </a:prstGeom>
+          <a:solidFill>
+            <a:srgbClr val="D62728"/>
+          </a:solidFill>
+          <a:ln>
+            <a:solidFill>
+              <a:srgbClr val="CACACA"/>
+            </a:solidFill>
+          </a:ln>
+          <a:effectLst>
+            <a:outerShdw blurRad="50800" dist="38100" dir="5400000" algn="t" rotWithShape="0">
+              <a:prstClr val="black">
+                <a:alpha val="40000"/>
+              </a:prstClr>
+            </a:outerShdw>
+          </a:effectLst>
+        </p:spPr>
+        <p:style>
+          <a:lnRef idx="2">
+            <a:schemeClr val="accent1">
+              <a:shade val="50000"/>
+            </a:schemeClr>
+          </a:lnRef>
+          <a:fillRef idx="1">
+            <a:schemeClr val="accent1"/>
+          </a:fillRef>
+          <a:effectRef idx="0">
+            <a:schemeClr val="accent1"/>
+          </a:effectRef>
+          <a:fontRef idx="minor">
+            <a:schemeClr val="lt1"/>
+          </a:fontRef>
+        </p:style>
+        <p:txBody>
+          <a:bodyPr rtlCol="0" anchor="ctr"/>
+          <a:lstStyle/>
+          <a:p>
+            <a:pPr algn="ctr"/>
+            <a:r>
+              <a:rPr lang="pt-BR" sz="633" dirty="0">
+                <a:solidFill>
+                  <a:schemeClr val="tx1"/>
+                </a:solidFill>
+              </a:rPr>
+              <a:t>DEP_M: Max - Min</a:t>
+            </a:r>
+          </a:p>
+        </p:txBody>
+      </p:sp>
+      <p:sp>
+        <p:nvSpPr>
+          <p:cNvPr id="45" name="Retângulo 44">
+            <a:extLst>
+              <a:ext uri="{FF2B5EF4-FFF2-40B4-BE49-F238E27FC236}">
+                <a16:creationId xmlns:a16="http://schemas.microsoft.com/office/drawing/2014/main" id="{9FAA9DD8-D928-79D9-96D0-0A0A0DC79D8B}"/>
+              </a:ext>
+            </a:extLst>
+          </p:cNvPr>
+          <p:cNvSpPr/>
+          <p:nvPr/>
+        </p:nvSpPr>
+        <p:spPr>
+          <a:xfrm>
+            <a:off x="7651417" y="1155089"/>
+            <a:ext cx="596437" cy="475337"/>
+          </a:xfrm>
+          <a:prstGeom prst="rect">
+            <a:avLst/>
+          </a:prstGeom>
+          <a:solidFill>
+            <a:srgbClr val="9467BD"/>
+          </a:solidFill>
+          <a:ln>
+            <a:solidFill>
+              <a:srgbClr val="CACACA"/>
+            </a:solidFill>
+          </a:ln>
+          <a:effectLst>
+            <a:outerShdw blurRad="50800" dist="38100" dir="5400000" algn="t" rotWithShape="0">
+              <a:prstClr val="black">
+                <a:alpha val="40000"/>
+              </a:prstClr>
+            </a:outerShdw>
+          </a:effectLst>
+        </p:spPr>
+        <p:style>
+          <a:lnRef idx="2">
+            <a:schemeClr val="accent1">
+              <a:shade val="50000"/>
+            </a:schemeClr>
+          </a:lnRef>
+          <a:fillRef idx="1">
+            <a:schemeClr val="accent1"/>
+          </a:fillRef>
+          <a:effectRef idx="0">
+            <a:schemeClr val="accent1"/>
+          </a:effectRef>
+          <a:fontRef idx="minor">
+            <a:schemeClr val="lt1"/>
+          </a:fontRef>
+        </p:style>
+        <p:txBody>
+          <a:bodyPr rtlCol="0" anchor="ctr"/>
+          <a:lstStyle/>
+          <a:p>
+            <a:pPr algn="ctr"/>
+            <a:r>
+              <a:rPr lang="pt-BR" sz="633" dirty="0">
+                <a:solidFill>
+                  <a:schemeClr val="tx1"/>
+                </a:solidFill>
+              </a:rPr>
+              <a:t>DEP_P: Max - Min</a:t>
+            </a:r>
+          </a:p>
+        </p:txBody>
+      </p:sp>
+      <p:sp>
+        <p:nvSpPr>
+          <p:cNvPr id="46" name="Retângulo 45">
+            <a:extLst>
+              <a:ext uri="{FF2B5EF4-FFF2-40B4-BE49-F238E27FC236}">
+                <a16:creationId xmlns:a16="http://schemas.microsoft.com/office/drawing/2014/main" id="{FA29CE8C-E394-A6AB-0DA3-152E354C2B3B}"/>
+              </a:ext>
+            </a:extLst>
+          </p:cNvPr>
+          <p:cNvSpPr/>
+          <p:nvPr/>
+        </p:nvSpPr>
+        <p:spPr>
+          <a:xfrm>
+            <a:off x="8948660" y="1135101"/>
+            <a:ext cx="595963" cy="475337"/>
+          </a:xfrm>
+          <a:prstGeom prst="rect">
+            <a:avLst/>
+          </a:prstGeom>
+          <a:solidFill>
+            <a:srgbClr val="8C564B"/>
+          </a:solidFill>
+          <a:ln>
+            <a:solidFill>
+              <a:srgbClr val="CACACA"/>
+            </a:solidFill>
+          </a:ln>
+          <a:effectLst>
+            <a:outerShdw blurRad="50800" dist="38100" dir="5400000" algn="t" rotWithShape="0">
+              <a:prstClr val="black">
+                <a:alpha val="40000"/>
+              </a:prstClr>
+            </a:outerShdw>
+          </a:effectLst>
+        </p:spPr>
+        <p:style>
+          <a:lnRef idx="2">
+            <a:schemeClr val="accent1">
+              <a:shade val="50000"/>
+            </a:schemeClr>
+          </a:lnRef>
+          <a:fillRef idx="1">
+            <a:schemeClr val="accent1"/>
+          </a:fillRef>
+          <a:effectRef idx="0">
+            <a:schemeClr val="accent1"/>
+          </a:effectRef>
+          <a:fontRef idx="minor">
+            <a:schemeClr val="lt1"/>
+          </a:fontRef>
+        </p:style>
+        <p:txBody>
+          <a:bodyPr rtlCol="0" anchor="ctr"/>
+          <a:lstStyle/>
+          <a:p>
+            <a:pPr algn="ctr"/>
+            <a:r>
+              <a:rPr lang="pt-BR" sz="633" dirty="0">
+                <a:solidFill>
+                  <a:schemeClr val="tx1"/>
+                </a:solidFill>
+              </a:rPr>
+              <a:t>DEP_STAY: Max - Min</a:t>
+            </a:r>
+          </a:p>
+        </p:txBody>
+      </p:sp>
+      <p:pic>
+        <p:nvPicPr>
+          <p:cNvPr id="49" name="Imagem 48">
+            <a:extLst>
+              <a:ext uri="{FF2B5EF4-FFF2-40B4-BE49-F238E27FC236}">
+                <a16:creationId xmlns:a16="http://schemas.microsoft.com/office/drawing/2014/main" id="{9533005A-4E9B-9675-D519-E0AC85535F0E}"/>
+              </a:ext>
+            </a:extLst>
+          </p:cNvPr>
+          <p:cNvPicPr>
+            <a:picLocks noChangeAspect="1"/>
+          </p:cNvPicPr>
+          <p:nvPr/>
+        </p:nvPicPr>
+        <p:blipFill>
+          <a:blip r:embed="rId2"/>
+          <a:stretch>
+            <a:fillRect/>
+          </a:stretch>
+        </p:blipFill>
+        <p:spPr>
+          <a:xfrm>
+            <a:off x="2481134" y="395986"/>
+            <a:ext cx="7229735" cy="647894"/>
+          </a:xfrm>
+          <a:prstGeom prst="rect">
+            <a:avLst/>
+          </a:prstGeom>
+        </p:spPr>
+      </p:pic>
+      <p:pic>
+        <p:nvPicPr>
+          <p:cNvPr id="51" name="Imagem 50">
+            <a:extLst>
+              <a:ext uri="{FF2B5EF4-FFF2-40B4-BE49-F238E27FC236}">
+                <a16:creationId xmlns:a16="http://schemas.microsoft.com/office/drawing/2014/main" id="{1981CABB-6258-FD87-F97D-354F5CAD1DC4}"/>
+              </a:ext>
+            </a:extLst>
+          </p:cNvPr>
+          <p:cNvPicPr>
+            <a:picLocks noChangeAspect="1"/>
+          </p:cNvPicPr>
+          <p:nvPr/>
+        </p:nvPicPr>
+        <p:blipFill>
+          <a:blip r:embed="rId3"/>
+          <a:stretch>
+            <a:fillRect/>
+          </a:stretch>
+        </p:blipFill>
+        <p:spPr>
+          <a:xfrm>
+            <a:off x="2498001" y="2369581"/>
+            <a:ext cx="7229735" cy="1400285"/>
+          </a:xfrm>
+          <a:prstGeom prst="rect">
+            <a:avLst/>
+          </a:prstGeom>
+        </p:spPr>
+      </p:pic>
+      <p:pic>
+        <p:nvPicPr>
+          <p:cNvPr id="53" name="Imagem 52">
+            <a:extLst>
+              <a:ext uri="{FF2B5EF4-FFF2-40B4-BE49-F238E27FC236}">
+                <a16:creationId xmlns:a16="http://schemas.microsoft.com/office/drawing/2014/main" id="{2FD4C93E-6196-58C9-0AA0-E72006EE5297}"/>
+              </a:ext>
+            </a:extLst>
+          </p:cNvPr>
+          <p:cNvPicPr>
+            <a:picLocks noChangeAspect="1"/>
+          </p:cNvPicPr>
+          <p:nvPr/>
+        </p:nvPicPr>
+        <p:blipFill>
+          <a:blip r:embed="rId4"/>
+          <a:stretch>
+            <a:fillRect/>
+          </a:stretch>
+        </p:blipFill>
+        <p:spPr>
+          <a:xfrm>
+            <a:off x="2490188" y="3914426"/>
+            <a:ext cx="7229735" cy="1146364"/>
+          </a:xfrm>
+          <a:prstGeom prst="rect">
+            <a:avLst/>
+          </a:prstGeom>
+        </p:spPr>
+      </p:pic>
+    </p:spTree>
+    <p:extLst>
+      <p:ext uri="{BB962C8B-B14F-4D97-AF65-F5344CB8AC3E}">
+        <p14:creationId xmlns:p14="http://schemas.microsoft.com/office/powerpoint/2010/main" val="409105185"/>
+      </p:ext>
+    </p:extLst>
+  </p:cSld>
+  <p:clrMapOvr>
+    <a:masterClrMapping/>
+  </p:clrMapOvr>
+</p:sld>
+</file>
+
+<file path=ppt/slides/slide9.xml><?xml version="1.0" encoding="utf-8"?>
+<p:sld xmlns:a="http://schemas.openxmlformats.org/drawingml/2006/main" xmlns:r="http://schemas.openxmlformats.org/officeDocument/2006/relationships" xmlns:p="http://schemas.openxmlformats.org/presentationml/2006/main">
+  <p:cSld>
+    <p:spTree>
+      <p:nvGrpSpPr>
+        <p:cNvPr id="1" name=""/>
+        <p:cNvGrpSpPr/>
+        <p:nvPr/>
+      </p:nvGrpSpPr>
+      <p:grpSpPr>
+        <a:xfrm>
+          <a:off x="0" y="0"/>
+          <a:ext cx="0" cy="0"/>
+          <a:chOff x="0" y="0"/>
+          <a:chExt cx="0" cy="0"/>
+        </a:xfrm>
+      </p:grpSpPr>
+      <p:sp>
+        <p:nvSpPr>
+          <p:cNvPr id="33" name="Retângulo 32">
+            <a:extLst>
+              <a:ext uri="{FF2B5EF4-FFF2-40B4-BE49-F238E27FC236}">
+                <a16:creationId xmlns:a16="http://schemas.microsoft.com/office/drawing/2014/main" id="{3ACF86DC-AC76-85F4-D538-48DDCD9EB06A}"/>
+              </a:ext>
+            </a:extLst>
+          </p:cNvPr>
+          <p:cNvSpPr/>
+          <p:nvPr/>
+        </p:nvSpPr>
+        <p:spPr>
+          <a:xfrm>
+            <a:off x="3288937" y="1878966"/>
+            <a:ext cx="798562" cy="185808"/>
+          </a:xfrm>
+          <a:prstGeom prst="rect">
+            <a:avLst/>
+          </a:prstGeom>
+          <a:solidFill>
+            <a:srgbClr val="E1E1E1"/>
+          </a:solidFill>
+          <a:ln>
+            <a:solidFill>
+              <a:srgbClr val="CACACA"/>
+            </a:solidFill>
+          </a:ln>
+          <a:effectLst>
+            <a:outerShdw blurRad="50800" dist="38100" dir="5400000" algn="t" rotWithShape="0">
+              <a:prstClr val="black">
+                <a:alpha val="40000"/>
+              </a:prstClr>
+            </a:outerShdw>
+          </a:effectLst>
+        </p:spPr>
+        <p:style>
+          <a:lnRef idx="2">
+            <a:schemeClr val="accent1">
+              <a:shade val="50000"/>
+            </a:schemeClr>
+          </a:lnRef>
+          <a:fillRef idx="1">
+            <a:schemeClr val="accent1"/>
+          </a:fillRef>
+          <a:effectRef idx="0">
+            <a:schemeClr val="accent1"/>
+          </a:effectRef>
+          <a:fontRef idx="minor">
+            <a:schemeClr val="lt1"/>
+          </a:fontRef>
+        </p:style>
+        <p:txBody>
+          <a:bodyPr rtlCol="0" anchor="ctr"/>
+          <a:lstStyle/>
+          <a:p>
+            <a:pPr algn="ctr"/>
+            <a:r>
+              <a:rPr lang="pt-BR" sz="1013" dirty="0">
+                <a:solidFill>
+                  <a:schemeClr val="tx1"/>
+                </a:solidFill>
+              </a:rPr>
+              <a:t>10</a:t>
+            </a:r>
+          </a:p>
+        </p:txBody>
+      </p:sp>
+      <p:sp>
+        <p:nvSpPr>
+          <p:cNvPr id="34" name="CaixaDeTexto 33">
+            <a:extLst>
+              <a:ext uri="{FF2B5EF4-FFF2-40B4-BE49-F238E27FC236}">
+                <a16:creationId xmlns:a16="http://schemas.microsoft.com/office/drawing/2014/main" id="{DC595E16-A2FA-65C4-ECFE-F446639B7F8D}"/>
+              </a:ext>
+            </a:extLst>
+          </p:cNvPr>
+          <p:cNvSpPr txBox="1"/>
+          <p:nvPr/>
+        </p:nvSpPr>
+        <p:spPr>
+          <a:xfrm>
+            <a:off x="2393963" y="1883275"/>
+            <a:ext cx="894974" cy="209160"/>
+          </a:xfrm>
+          <a:prstGeom prst="rect">
+            <a:avLst/>
+          </a:prstGeom>
+          <a:noFill/>
+        </p:spPr>
+        <p:txBody>
+          <a:bodyPr wrap="square" rtlCol="0">
+            <a:spAutoFit/>
+          </a:bodyPr>
+          <a:lstStyle>
+            <a:defPPr>
+              <a:defRPr lang="pt-BR"/>
+            </a:defPPr>
+            <a:lvl1pPr>
+              <a:defRPr sz="1400"/>
+            </a:lvl1pPr>
+          </a:lstStyle>
+          <a:p>
+            <a:r>
+              <a:rPr lang="pt-BR" sz="759" dirty="0"/>
+              <a:t>Quant itens:</a:t>
+            </a:r>
+          </a:p>
+        </p:txBody>
+      </p:sp>
+      <p:grpSp>
+        <p:nvGrpSpPr>
+          <p:cNvPr id="35" name="Agrupar 34">
+            <a:extLst>
+              <a:ext uri="{FF2B5EF4-FFF2-40B4-BE49-F238E27FC236}">
+                <a16:creationId xmlns:a16="http://schemas.microsoft.com/office/drawing/2014/main" id="{D1E51561-79CF-BC97-BBFD-EFCB649EBD91}"/>
+              </a:ext>
+            </a:extLst>
+          </p:cNvPr>
+          <p:cNvGrpSpPr/>
+          <p:nvPr/>
+        </p:nvGrpSpPr>
+        <p:grpSpPr>
+          <a:xfrm>
+            <a:off x="3957902" y="1938505"/>
+            <a:ext cx="39399" cy="36942"/>
+            <a:chOff x="8136641" y="4572000"/>
+            <a:chExt cx="1155141" cy="1044080"/>
+          </a:xfrm>
+        </p:grpSpPr>
+        <p:cxnSp>
+          <p:nvCxnSpPr>
+            <p:cNvPr id="36" name="Conector reto 35">
+              <a:extLst>
+                <a:ext uri="{FF2B5EF4-FFF2-40B4-BE49-F238E27FC236}">
+                  <a16:creationId xmlns:a16="http://schemas.microsoft.com/office/drawing/2014/main" id="{A47211E0-252B-180D-0C9B-CCB0CD550642}"/>
+                </a:ext>
+              </a:extLst>
+            </p:cNvPr>
+            <p:cNvCxnSpPr>
+              <a:cxnSpLocks/>
+            </p:cNvCxnSpPr>
+            <p:nvPr/>
+          </p:nvCxnSpPr>
+          <p:spPr>
+            <a:xfrm>
+              <a:off x="8731824" y="4572000"/>
+              <a:ext cx="559958" cy="1044080"/>
+            </a:xfrm>
+            <a:prstGeom prst="line">
+              <a:avLst/>
+            </a:prstGeom>
+            <a:ln>
+              <a:solidFill>
+                <a:schemeClr val="tx1"/>
+              </a:solidFill>
+            </a:ln>
+          </p:spPr>
+          <p:style>
+            <a:lnRef idx="1">
+              <a:schemeClr val="accent1"/>
+            </a:lnRef>
+            <a:fillRef idx="0">
+              <a:schemeClr val="accent1"/>
+            </a:fillRef>
+            <a:effectRef idx="0">
+              <a:schemeClr val="accent1"/>
+            </a:effectRef>
+            <a:fontRef idx="minor">
+              <a:schemeClr val="tx1"/>
+            </a:fontRef>
+          </p:style>
+        </p:cxnSp>
+        <p:cxnSp>
+          <p:nvCxnSpPr>
+            <p:cNvPr id="37" name="Conector reto 36">
+              <a:extLst>
+                <a:ext uri="{FF2B5EF4-FFF2-40B4-BE49-F238E27FC236}">
+                  <a16:creationId xmlns:a16="http://schemas.microsoft.com/office/drawing/2014/main" id="{A6F47C0C-7DB5-6937-7E41-A19D00A0F0DE}"/>
+                </a:ext>
+              </a:extLst>
+            </p:cNvPr>
+            <p:cNvCxnSpPr>
+              <a:cxnSpLocks/>
+            </p:cNvCxnSpPr>
+            <p:nvPr/>
+          </p:nvCxnSpPr>
+          <p:spPr>
+            <a:xfrm flipH="1">
+              <a:off x="8136641" y="4584366"/>
+              <a:ext cx="595183" cy="1031714"/>
+            </a:xfrm>
+            <a:prstGeom prst="line">
+              <a:avLst/>
+            </a:prstGeom>
+            <a:ln>
+              <a:solidFill>
+                <a:schemeClr val="tx1"/>
+              </a:solidFill>
+            </a:ln>
+          </p:spPr>
+          <p:style>
+            <a:lnRef idx="1">
+              <a:schemeClr val="accent1"/>
+            </a:lnRef>
+            <a:fillRef idx="0">
+              <a:schemeClr val="accent1"/>
+            </a:fillRef>
+            <a:effectRef idx="0">
+              <a:schemeClr val="accent1"/>
+            </a:effectRef>
+            <a:fontRef idx="minor">
+              <a:schemeClr val="tx1"/>
+            </a:fontRef>
+          </p:style>
+        </p:cxnSp>
+      </p:grpSp>
+      <p:sp>
+        <p:nvSpPr>
+          <p:cNvPr id="38" name="Retângulo 37">
+            <a:extLst>
+              <a:ext uri="{FF2B5EF4-FFF2-40B4-BE49-F238E27FC236}">
+                <a16:creationId xmlns:a16="http://schemas.microsoft.com/office/drawing/2014/main" id="{FFED6F38-D8AB-CD3B-E07A-762F400882DD}"/>
+              </a:ext>
+            </a:extLst>
+          </p:cNvPr>
+          <p:cNvSpPr/>
+          <p:nvPr/>
+        </p:nvSpPr>
+        <p:spPr>
+          <a:xfrm>
+            <a:off x="2543468" y="1139621"/>
+            <a:ext cx="595964" cy="488785"/>
+          </a:xfrm>
+          <a:prstGeom prst="rect">
+            <a:avLst/>
+          </a:prstGeom>
+          <a:solidFill>
+            <a:srgbClr val="1F77B4"/>
+          </a:solidFill>
+          <a:ln>
+            <a:solidFill>
+              <a:srgbClr val="CACACA"/>
+            </a:solidFill>
+          </a:ln>
+          <a:effectLst>
+            <a:outerShdw blurRad="50800" dist="38100" dir="5400000" algn="t" rotWithShape="0">
+              <a:prstClr val="black">
+                <a:alpha val="40000"/>
+              </a:prstClr>
+            </a:outerShdw>
+          </a:effectLst>
+        </p:spPr>
+        <p:style>
+          <a:lnRef idx="2">
+            <a:schemeClr val="accent1">
+              <a:shade val="50000"/>
+            </a:schemeClr>
+          </a:lnRef>
+          <a:fillRef idx="1">
+            <a:schemeClr val="accent1"/>
+          </a:fillRef>
+          <a:effectRef idx="0">
+            <a:schemeClr val="accent1"/>
+          </a:effectRef>
+          <a:fontRef idx="minor">
+            <a:schemeClr val="lt1"/>
+          </a:fontRef>
+        </p:style>
+        <p:txBody>
+          <a:bodyPr rtlCol="0" anchor="ctr"/>
+          <a:lstStyle/>
+          <a:p>
+            <a:pPr algn="ctr"/>
+            <a:r>
+              <a:rPr lang="pt-BR" sz="633" dirty="0">
+                <a:solidFill>
+                  <a:schemeClr val="tx1"/>
+                </a:solidFill>
+              </a:rPr>
+              <a:t>DEP_PE_365: Max - Min</a:t>
+            </a:r>
+          </a:p>
+        </p:txBody>
+      </p:sp>
+      <p:grpSp>
+        <p:nvGrpSpPr>
+          <p:cNvPr id="39" name="Agrupar 38">
+            <a:extLst>
+              <a:ext uri="{FF2B5EF4-FFF2-40B4-BE49-F238E27FC236}">
+                <a16:creationId xmlns:a16="http://schemas.microsoft.com/office/drawing/2014/main" id="{1F3AE3C7-E3B8-2D53-D79C-5144DD1E2581}"/>
+              </a:ext>
+            </a:extLst>
+          </p:cNvPr>
+          <p:cNvGrpSpPr/>
+          <p:nvPr/>
+        </p:nvGrpSpPr>
+        <p:grpSpPr>
+          <a:xfrm rot="10800000">
+            <a:off x="3957902" y="1994963"/>
+            <a:ext cx="39399" cy="36942"/>
+            <a:chOff x="8136641" y="4572000"/>
+            <a:chExt cx="1155141" cy="1044080"/>
+          </a:xfrm>
+        </p:grpSpPr>
+        <p:cxnSp>
+          <p:nvCxnSpPr>
+            <p:cNvPr id="40" name="Conector reto 39">
+              <a:extLst>
+                <a:ext uri="{FF2B5EF4-FFF2-40B4-BE49-F238E27FC236}">
+                  <a16:creationId xmlns:a16="http://schemas.microsoft.com/office/drawing/2014/main" id="{AFEB5656-556C-1C47-DFEC-5F9C219F693A}"/>
+                </a:ext>
+              </a:extLst>
+            </p:cNvPr>
+            <p:cNvCxnSpPr>
+              <a:cxnSpLocks/>
+            </p:cNvCxnSpPr>
+            <p:nvPr/>
+          </p:nvCxnSpPr>
+          <p:spPr>
+            <a:xfrm>
+              <a:off x="8731824" y="4572000"/>
+              <a:ext cx="559958" cy="1044080"/>
+            </a:xfrm>
+            <a:prstGeom prst="line">
+              <a:avLst/>
+            </a:prstGeom>
+            <a:ln>
+              <a:solidFill>
+                <a:schemeClr val="tx1"/>
+              </a:solidFill>
+            </a:ln>
+          </p:spPr>
+          <p:style>
+            <a:lnRef idx="1">
+              <a:schemeClr val="accent1"/>
+            </a:lnRef>
+            <a:fillRef idx="0">
+              <a:schemeClr val="accent1"/>
+            </a:fillRef>
+            <a:effectRef idx="0">
+              <a:schemeClr val="accent1"/>
+            </a:effectRef>
+            <a:fontRef idx="minor">
+              <a:schemeClr val="tx1"/>
+            </a:fontRef>
+          </p:style>
+        </p:cxnSp>
+        <p:cxnSp>
+          <p:nvCxnSpPr>
+            <p:cNvPr id="41" name="Conector reto 40">
+              <a:extLst>
+                <a:ext uri="{FF2B5EF4-FFF2-40B4-BE49-F238E27FC236}">
+                  <a16:creationId xmlns:a16="http://schemas.microsoft.com/office/drawing/2014/main" id="{EC9692C0-6D52-6DDF-9817-0F4F06A35150}"/>
+                </a:ext>
+              </a:extLst>
+            </p:cNvPr>
+            <p:cNvCxnSpPr>
+              <a:cxnSpLocks/>
+            </p:cNvCxnSpPr>
+            <p:nvPr/>
+          </p:nvCxnSpPr>
+          <p:spPr>
+            <a:xfrm flipH="1">
+              <a:off x="8136641" y="4584366"/>
+              <a:ext cx="595183" cy="1031714"/>
+            </a:xfrm>
+            <a:prstGeom prst="line">
+              <a:avLst/>
+            </a:prstGeom>
+            <a:ln>
+              <a:solidFill>
+                <a:schemeClr val="tx1"/>
+              </a:solidFill>
+            </a:ln>
+          </p:spPr>
+          <p:style>
+            <a:lnRef idx="1">
+              <a:schemeClr val="accent1"/>
+            </a:lnRef>
+            <a:fillRef idx="0">
+              <a:schemeClr val="accent1"/>
+            </a:fillRef>
+            <a:effectRef idx="0">
+              <a:schemeClr val="accent1"/>
+            </a:effectRef>
+            <a:fontRef idx="minor">
+              <a:schemeClr val="tx1"/>
+            </a:fontRef>
+          </p:style>
+        </p:cxnSp>
+      </p:grpSp>
+      <p:sp>
+        <p:nvSpPr>
+          <p:cNvPr id="42" name="Retângulo 41">
+            <a:extLst>
+              <a:ext uri="{FF2B5EF4-FFF2-40B4-BE49-F238E27FC236}">
+                <a16:creationId xmlns:a16="http://schemas.microsoft.com/office/drawing/2014/main" id="{0A82667E-4733-A63D-15AD-2E475E867189}"/>
+              </a:ext>
+            </a:extLst>
+          </p:cNvPr>
+          <p:cNvSpPr/>
+          <p:nvPr/>
+        </p:nvSpPr>
+        <p:spPr>
+          <a:xfrm>
+            <a:off x="3699082" y="1163246"/>
+            <a:ext cx="596437" cy="488785"/>
+          </a:xfrm>
+          <a:prstGeom prst="rect">
+            <a:avLst/>
+          </a:prstGeom>
+          <a:solidFill>
+            <a:srgbClr val="FF7F0E">
+              <a:alpha val="50196"/>
+            </a:srgbClr>
+          </a:solidFill>
+          <a:ln>
+            <a:solidFill>
+              <a:srgbClr val="CACACA"/>
+            </a:solidFill>
+          </a:ln>
+          <a:effectLst>
+            <a:outerShdw blurRad="50800" dist="38100" dir="5400000" algn="t" rotWithShape="0">
+              <a:prstClr val="black">
+                <a:alpha val="40000"/>
+              </a:prstClr>
+            </a:outerShdw>
+          </a:effectLst>
+        </p:spPr>
+        <p:style>
+          <a:lnRef idx="2">
+            <a:schemeClr val="accent1">
+              <a:shade val="50000"/>
+            </a:schemeClr>
+          </a:lnRef>
+          <a:fillRef idx="1">
+            <a:schemeClr val="accent1"/>
+          </a:fillRef>
+          <a:effectRef idx="0">
+            <a:schemeClr val="accent1"/>
+          </a:effectRef>
+          <a:fontRef idx="minor">
+            <a:schemeClr val="lt1"/>
+          </a:fontRef>
+        </p:style>
+        <p:txBody>
+          <a:bodyPr rtlCol="0" anchor="ctr"/>
+          <a:lstStyle/>
+          <a:p>
+            <a:pPr algn="ctr"/>
+            <a:r>
+              <a:rPr lang="pt-BR" sz="633" dirty="0">
+                <a:solidFill>
+                  <a:schemeClr val="tx1"/>
+                </a:solidFill>
+              </a:rPr>
+              <a:t>DEP_PE_450: Max - Min</a:t>
+            </a:r>
+          </a:p>
+        </p:txBody>
+      </p:sp>
+      <p:sp>
+        <p:nvSpPr>
+          <p:cNvPr id="43" name="Retângulo 42">
+            <a:extLst>
+              <a:ext uri="{FF2B5EF4-FFF2-40B4-BE49-F238E27FC236}">
+                <a16:creationId xmlns:a16="http://schemas.microsoft.com/office/drawing/2014/main" id="{784C8097-AC4A-B9C0-D194-F38F006788A0}"/>
+              </a:ext>
+            </a:extLst>
+          </p:cNvPr>
+          <p:cNvSpPr/>
+          <p:nvPr/>
+        </p:nvSpPr>
+        <p:spPr>
+          <a:xfrm>
+            <a:off x="5038005" y="1168763"/>
+            <a:ext cx="596437" cy="488787"/>
+          </a:xfrm>
+          <a:prstGeom prst="rect">
+            <a:avLst/>
+          </a:prstGeom>
+          <a:solidFill>
+            <a:srgbClr val="2CA02C">
+              <a:alpha val="50196"/>
+            </a:srgbClr>
+          </a:solidFill>
+          <a:ln>
+            <a:solidFill>
+              <a:srgbClr val="CACACA"/>
+            </a:solidFill>
+          </a:ln>
+          <a:effectLst>
+            <a:outerShdw blurRad="50800" dist="38100" dir="5400000" algn="t" rotWithShape="0">
+              <a:prstClr val="black">
+                <a:alpha val="40000"/>
+              </a:prstClr>
+            </a:outerShdw>
+          </a:effectLst>
+        </p:spPr>
+        <p:style>
+          <a:lnRef idx="2">
+            <a:schemeClr val="accent1">
+              <a:shade val="50000"/>
+            </a:schemeClr>
+          </a:lnRef>
+          <a:fillRef idx="1">
+            <a:schemeClr val="accent1"/>
+          </a:fillRef>
+          <a:effectRef idx="0">
+            <a:schemeClr val="accent1"/>
+          </a:effectRef>
+          <a:fontRef idx="minor">
+            <a:schemeClr val="lt1"/>
+          </a:fontRef>
+        </p:style>
+        <p:txBody>
+          <a:bodyPr rtlCol="0" anchor="ctr"/>
+          <a:lstStyle/>
+          <a:p>
+            <a:pPr algn="ctr"/>
+            <a:r>
+              <a:rPr lang="pt-BR" sz="633" dirty="0">
+                <a:solidFill>
+                  <a:schemeClr val="tx1"/>
+                </a:solidFill>
+              </a:rPr>
+              <a:t>DEP_E: Max - Min</a:t>
+            </a:r>
+          </a:p>
+        </p:txBody>
+      </p:sp>
+      <p:sp>
+        <p:nvSpPr>
+          <p:cNvPr id="44" name="Retângulo 43">
+            <a:extLst>
+              <a:ext uri="{FF2B5EF4-FFF2-40B4-BE49-F238E27FC236}">
+                <a16:creationId xmlns:a16="http://schemas.microsoft.com/office/drawing/2014/main" id="{A0571FEB-B07E-791D-98D9-1F324A8ACCEC}"/>
+              </a:ext>
+            </a:extLst>
+          </p:cNvPr>
+          <p:cNvSpPr/>
+          <p:nvPr/>
+        </p:nvSpPr>
+        <p:spPr>
+          <a:xfrm>
+            <a:off x="6354172" y="1163246"/>
+            <a:ext cx="596437" cy="483697"/>
+          </a:xfrm>
+          <a:prstGeom prst="rect">
+            <a:avLst/>
+          </a:prstGeom>
+          <a:solidFill>
+            <a:srgbClr val="D62728">
+              <a:alpha val="50196"/>
+            </a:srgbClr>
+          </a:solidFill>
+          <a:ln>
+            <a:solidFill>
+              <a:srgbClr val="CACACA"/>
+            </a:solidFill>
+          </a:ln>
+          <a:effectLst>
+            <a:outerShdw blurRad="50800" dist="38100" dir="5400000" algn="t" rotWithShape="0">
+              <a:prstClr val="black">
+                <a:alpha val="40000"/>
+              </a:prstClr>
+            </a:outerShdw>
+          </a:effectLst>
+        </p:spPr>
+        <p:style>
+          <a:lnRef idx="2">
+            <a:schemeClr val="accent1">
+              <a:shade val="50000"/>
+            </a:schemeClr>
+          </a:lnRef>
+          <a:fillRef idx="1">
+            <a:schemeClr val="accent1"/>
+          </a:fillRef>
+          <a:effectRef idx="0">
+            <a:schemeClr val="accent1"/>
+          </a:effectRef>
+          <a:fontRef idx="minor">
+            <a:schemeClr val="lt1"/>
+          </a:fontRef>
+        </p:style>
+        <p:txBody>
+          <a:bodyPr rtlCol="0" anchor="ctr"/>
+          <a:lstStyle/>
+          <a:p>
+            <a:pPr algn="ctr"/>
+            <a:r>
+              <a:rPr lang="pt-BR" sz="633" dirty="0">
+                <a:solidFill>
+                  <a:schemeClr val="tx1"/>
+                </a:solidFill>
+              </a:rPr>
+              <a:t>DEP_M: Max - Min</a:t>
+            </a:r>
+          </a:p>
+        </p:txBody>
+      </p:sp>
+      <p:sp>
+        <p:nvSpPr>
+          <p:cNvPr id="45" name="Retângulo 44">
+            <a:extLst>
+              <a:ext uri="{FF2B5EF4-FFF2-40B4-BE49-F238E27FC236}">
+                <a16:creationId xmlns:a16="http://schemas.microsoft.com/office/drawing/2014/main" id="{9FAA9DD8-D928-79D9-96D0-0A0A0DC79D8B}"/>
+              </a:ext>
+            </a:extLst>
+          </p:cNvPr>
+          <p:cNvSpPr/>
+          <p:nvPr/>
+        </p:nvSpPr>
+        <p:spPr>
+          <a:xfrm>
+            <a:off x="7651417" y="1155089"/>
+            <a:ext cx="596437" cy="475337"/>
+          </a:xfrm>
+          <a:prstGeom prst="rect">
+            <a:avLst/>
+          </a:prstGeom>
+          <a:solidFill>
+            <a:srgbClr val="9467BD">
+              <a:alpha val="50196"/>
+            </a:srgbClr>
+          </a:solidFill>
+          <a:ln>
+            <a:solidFill>
+              <a:srgbClr val="CACACA"/>
+            </a:solidFill>
+          </a:ln>
+          <a:effectLst>
+            <a:outerShdw blurRad="50800" dist="38100" dir="5400000" algn="t" rotWithShape="0">
+              <a:prstClr val="black">
+                <a:alpha val="40000"/>
+              </a:prstClr>
+            </a:outerShdw>
+          </a:effectLst>
+        </p:spPr>
+        <p:style>
+          <a:lnRef idx="2">
+            <a:schemeClr val="accent1">
+              <a:shade val="50000"/>
+            </a:schemeClr>
+          </a:lnRef>
+          <a:fillRef idx="1">
+            <a:schemeClr val="accent1"/>
+          </a:fillRef>
+          <a:effectRef idx="0">
+            <a:schemeClr val="accent1"/>
+          </a:effectRef>
+          <a:fontRef idx="minor">
+            <a:schemeClr val="lt1"/>
+          </a:fontRef>
+        </p:style>
+        <p:txBody>
+          <a:bodyPr rtlCol="0" anchor="ctr"/>
+          <a:lstStyle/>
+          <a:p>
+            <a:pPr algn="ctr"/>
+            <a:r>
+              <a:rPr lang="pt-BR" sz="633" dirty="0">
+                <a:solidFill>
+                  <a:schemeClr val="tx1"/>
+                </a:solidFill>
+              </a:rPr>
+              <a:t>DEP_P: Max - Min</a:t>
+            </a:r>
+          </a:p>
+        </p:txBody>
+      </p:sp>
+      <p:sp>
+        <p:nvSpPr>
+          <p:cNvPr id="46" name="Retângulo 45">
+            <a:extLst>
+              <a:ext uri="{FF2B5EF4-FFF2-40B4-BE49-F238E27FC236}">
+                <a16:creationId xmlns:a16="http://schemas.microsoft.com/office/drawing/2014/main" id="{FA29CE8C-E394-A6AB-0DA3-152E354C2B3B}"/>
+              </a:ext>
+            </a:extLst>
+          </p:cNvPr>
+          <p:cNvSpPr/>
+          <p:nvPr/>
+        </p:nvSpPr>
+        <p:spPr>
+          <a:xfrm>
+            <a:off x="8948660" y="1135101"/>
+            <a:ext cx="595963" cy="475337"/>
+          </a:xfrm>
+          <a:prstGeom prst="rect">
+            <a:avLst/>
+          </a:prstGeom>
+          <a:solidFill>
+            <a:srgbClr val="8C564B">
+              <a:alpha val="50196"/>
+            </a:srgbClr>
+          </a:solidFill>
+          <a:ln>
+            <a:solidFill>
+              <a:srgbClr val="CACACA"/>
+            </a:solidFill>
+          </a:ln>
+          <a:effectLst>
+            <a:outerShdw blurRad="50800" dist="38100" dir="5400000" algn="t" rotWithShape="0">
+              <a:prstClr val="black">
+                <a:alpha val="40000"/>
+              </a:prstClr>
+            </a:outerShdw>
+          </a:effectLst>
+        </p:spPr>
+        <p:style>
+          <a:lnRef idx="2">
+            <a:schemeClr val="accent1">
+              <a:shade val="50000"/>
+            </a:schemeClr>
+          </a:lnRef>
+          <a:fillRef idx="1">
+            <a:schemeClr val="accent1"/>
+          </a:fillRef>
+          <a:effectRef idx="0">
+            <a:schemeClr val="accent1"/>
+          </a:effectRef>
+          <a:fontRef idx="minor">
+            <a:schemeClr val="lt1"/>
+          </a:fontRef>
+        </p:style>
+        <p:txBody>
+          <a:bodyPr rtlCol="0" anchor="ctr"/>
+          <a:lstStyle/>
+          <a:p>
+            <a:pPr algn="ctr"/>
+            <a:r>
+              <a:rPr lang="pt-BR" sz="633" dirty="0">
+                <a:solidFill>
+                  <a:schemeClr val="tx1"/>
+                </a:solidFill>
+              </a:rPr>
+              <a:t>DEP_STAY: Max - Min</a:t>
+            </a:r>
+          </a:p>
+        </p:txBody>
+      </p:sp>
+      <p:pic>
+        <p:nvPicPr>
+          <p:cNvPr id="49" name="Imagem 48">
+            <a:extLst>
+              <a:ext uri="{FF2B5EF4-FFF2-40B4-BE49-F238E27FC236}">
+                <a16:creationId xmlns:a16="http://schemas.microsoft.com/office/drawing/2014/main" id="{9533005A-4E9B-9675-D519-E0AC85535F0E}"/>
+              </a:ext>
+            </a:extLst>
+          </p:cNvPr>
+          <p:cNvPicPr>
+            <a:picLocks noChangeAspect="1"/>
+          </p:cNvPicPr>
+          <p:nvPr/>
+        </p:nvPicPr>
+        <p:blipFill>
+          <a:blip r:embed="rId2"/>
+          <a:stretch>
+            <a:fillRect/>
+          </a:stretch>
+        </p:blipFill>
+        <p:spPr>
+          <a:xfrm>
+            <a:off x="2481134" y="395986"/>
+            <a:ext cx="7229735" cy="647894"/>
+          </a:xfrm>
+          <a:prstGeom prst="rect">
+            <a:avLst/>
+          </a:prstGeom>
+        </p:spPr>
+      </p:pic>
+      <p:pic>
+        <p:nvPicPr>
+          <p:cNvPr id="51" name="Imagem 50">
+            <a:extLst>
+              <a:ext uri="{FF2B5EF4-FFF2-40B4-BE49-F238E27FC236}">
+                <a16:creationId xmlns:a16="http://schemas.microsoft.com/office/drawing/2014/main" id="{1981CABB-6258-FD87-F97D-354F5CAD1DC4}"/>
+              </a:ext>
+            </a:extLst>
+          </p:cNvPr>
+          <p:cNvPicPr>
+            <a:picLocks noChangeAspect="1"/>
+          </p:cNvPicPr>
+          <p:nvPr/>
+        </p:nvPicPr>
+        <p:blipFill>
+          <a:blip r:embed="rId3"/>
+          <a:stretch>
+            <a:fillRect/>
+          </a:stretch>
+        </p:blipFill>
+        <p:spPr>
+          <a:xfrm>
+            <a:off x="2498001" y="2369581"/>
+            <a:ext cx="7229735" cy="1400285"/>
+          </a:xfrm>
+          <a:prstGeom prst="rect">
+            <a:avLst/>
+          </a:prstGeom>
+        </p:spPr>
+      </p:pic>
+      <p:pic>
+        <p:nvPicPr>
+          <p:cNvPr id="53" name="Imagem 52">
+            <a:extLst>
+              <a:ext uri="{FF2B5EF4-FFF2-40B4-BE49-F238E27FC236}">
+                <a16:creationId xmlns:a16="http://schemas.microsoft.com/office/drawing/2014/main" id="{2FD4C93E-6196-58C9-0AA0-E72006EE5297}"/>
+              </a:ext>
+            </a:extLst>
+          </p:cNvPr>
+          <p:cNvPicPr>
+            <a:picLocks noChangeAspect="1"/>
+          </p:cNvPicPr>
+          <p:nvPr/>
+        </p:nvPicPr>
+        <p:blipFill>
+          <a:blip r:embed="rId4"/>
+          <a:stretch>
+            <a:fillRect/>
+          </a:stretch>
+        </p:blipFill>
+        <p:spPr>
+          <a:xfrm>
+            <a:off x="2490188" y="3914426"/>
+            <a:ext cx="7229735" cy="1146364"/>
+          </a:xfrm>
+          <a:prstGeom prst="rect">
+            <a:avLst/>
+          </a:prstGeom>
+        </p:spPr>
+      </p:pic>
+      <p:grpSp>
+        <p:nvGrpSpPr>
+          <p:cNvPr id="5" name="Agrupar 4">
+            <a:extLst>
+              <a:ext uri="{FF2B5EF4-FFF2-40B4-BE49-F238E27FC236}">
+                <a16:creationId xmlns:a16="http://schemas.microsoft.com/office/drawing/2014/main" id="{50658F45-7548-0E00-0C11-A04BD1DBB8E7}"/>
+              </a:ext>
+            </a:extLst>
+          </p:cNvPr>
+          <p:cNvGrpSpPr/>
+          <p:nvPr/>
+        </p:nvGrpSpPr>
+        <p:grpSpPr>
+          <a:xfrm>
+            <a:off x="4419600" y="1813546"/>
+            <a:ext cx="1214842" cy="369332"/>
+            <a:chOff x="4419600" y="1813546"/>
+            <a:chExt cx="1214842" cy="369332"/>
+          </a:xfrm>
+        </p:grpSpPr>
+        <p:sp>
+          <p:nvSpPr>
+            <p:cNvPr id="3" name="Elipse 2">
+              <a:extLst>
+                <a:ext uri="{FF2B5EF4-FFF2-40B4-BE49-F238E27FC236}">
+                  <a16:creationId xmlns:a16="http://schemas.microsoft.com/office/drawing/2014/main" id="{C05764B5-29E8-3B13-175E-CFD7B0B8DC2A}"/>
+                </a:ext>
+              </a:extLst>
+            </p:cNvPr>
+            <p:cNvSpPr/>
+            <p:nvPr/>
+          </p:nvSpPr>
+          <p:spPr>
+            <a:xfrm>
+              <a:off x="4419600" y="1938505"/>
+              <a:ext cx="129540" cy="129540"/>
+            </a:xfrm>
+            <a:prstGeom prst="ellipse">
+              <a:avLst/>
+            </a:prstGeom>
+            <a:solidFill>
+              <a:schemeClr val="bg1"/>
+            </a:solidFill>
+            <a:ln>
+              <a:solidFill>
+                <a:schemeClr val="tx1"/>
+              </a:solidFill>
+            </a:ln>
+          </p:spPr>
+          <p:style>
+            <a:lnRef idx="2">
+              <a:schemeClr val="accent1">
+                <a:shade val="50000"/>
+              </a:schemeClr>
+            </a:lnRef>
+            <a:fillRef idx="1">
+              <a:schemeClr val="accent1"/>
+            </a:fillRef>
+            <a:effectRef idx="0">
+              <a:schemeClr val="accent1"/>
+            </a:effectRef>
+            <a:fontRef idx="minor">
+              <a:schemeClr val="lt1"/>
+            </a:fontRef>
+          </p:style>
+          <p:txBody>
+            <a:bodyPr rtlCol="0" anchor="ctr"/>
+            <a:lstStyle/>
+            <a:p>
+              <a:pPr algn="ctr"/>
+              <a:endParaRPr lang="pt-BR" dirty="0"/>
+            </a:p>
+          </p:txBody>
+        </p:sp>
+        <p:sp>
+          <p:nvSpPr>
+            <p:cNvPr id="21" name="Elipse 20">
+              <a:extLst>
+                <a:ext uri="{FF2B5EF4-FFF2-40B4-BE49-F238E27FC236}">
+                  <a16:creationId xmlns:a16="http://schemas.microsoft.com/office/drawing/2014/main" id="{A83D7512-DC58-2DDF-20D8-3D87B33FCEF8}"/>
+                </a:ext>
+              </a:extLst>
+            </p:cNvPr>
+            <p:cNvSpPr/>
+            <p:nvPr/>
+          </p:nvSpPr>
+          <p:spPr>
+            <a:xfrm>
+              <a:off x="4447344" y="1962644"/>
+              <a:ext cx="74052" cy="74052"/>
+            </a:xfrm>
+            <a:prstGeom prst="ellipse">
+              <a:avLst/>
+            </a:prstGeom>
+            <a:solidFill>
+              <a:schemeClr val="tx1"/>
+            </a:solidFill>
+            <a:ln>
+              <a:solidFill>
+                <a:schemeClr val="tx1"/>
+              </a:solidFill>
+            </a:ln>
+          </p:spPr>
+          <p:style>
+            <a:lnRef idx="2">
+              <a:schemeClr val="accent1">
+                <a:shade val="50000"/>
+              </a:schemeClr>
+            </a:lnRef>
+            <a:fillRef idx="1">
+              <a:schemeClr val="accent1"/>
+            </a:fillRef>
+            <a:effectRef idx="0">
+              <a:schemeClr val="accent1"/>
+            </a:effectRef>
+            <a:fontRef idx="minor">
+              <a:schemeClr val="lt1"/>
+            </a:fontRef>
+          </p:style>
+          <p:txBody>
+            <a:bodyPr rtlCol="0" anchor="ctr"/>
+            <a:lstStyle/>
+            <a:p>
+              <a:pPr algn="ctr"/>
+              <a:endParaRPr lang="pt-BR"/>
+            </a:p>
+          </p:txBody>
+        </p:sp>
+        <p:sp>
+          <p:nvSpPr>
+            <p:cNvPr id="4" name="CaixaDeTexto 3">
+              <a:extLst>
+                <a:ext uri="{FF2B5EF4-FFF2-40B4-BE49-F238E27FC236}">
+                  <a16:creationId xmlns:a16="http://schemas.microsoft.com/office/drawing/2014/main" id="{0C77237C-3E2A-A3D9-51C4-7DB65D6AB618}"/>
+                </a:ext>
+              </a:extLst>
+            </p:cNvPr>
+            <p:cNvSpPr txBox="1"/>
+            <p:nvPr/>
+          </p:nvSpPr>
+          <p:spPr>
+            <a:xfrm>
+              <a:off x="4521250" y="1813546"/>
+              <a:ext cx="1113192" cy="369332"/>
+            </a:xfrm>
+            <a:prstGeom prst="rect">
+              <a:avLst/>
+            </a:prstGeom>
+            <a:noFill/>
+          </p:spPr>
+          <p:txBody>
+            <a:bodyPr wrap="square" rtlCol="0">
+              <a:spAutoFit/>
+            </a:bodyPr>
+            <a:lstStyle/>
+            <a:p>
+              <a:r>
+                <a:rPr lang="pt-BR" dirty="0"/>
+                <a:t>Crescente</a:t>
+              </a:r>
+            </a:p>
+          </p:txBody>
+        </p:sp>
+      </p:grpSp>
+      <p:grpSp>
+        <p:nvGrpSpPr>
+          <p:cNvPr id="24" name="Agrupar 23">
+            <a:extLst>
+              <a:ext uri="{FF2B5EF4-FFF2-40B4-BE49-F238E27FC236}">
+                <a16:creationId xmlns:a16="http://schemas.microsoft.com/office/drawing/2014/main" id="{EA52A89E-6EAF-F029-2A39-376874D92422}"/>
+              </a:ext>
+            </a:extLst>
+          </p:cNvPr>
+          <p:cNvGrpSpPr/>
+          <p:nvPr/>
+        </p:nvGrpSpPr>
+        <p:grpSpPr>
+          <a:xfrm>
+            <a:off x="5634442" y="1818609"/>
+            <a:ext cx="1442632" cy="369332"/>
+            <a:chOff x="4419600" y="1813546"/>
+            <a:chExt cx="1442632" cy="369332"/>
+          </a:xfrm>
+        </p:grpSpPr>
+        <p:sp>
+          <p:nvSpPr>
+            <p:cNvPr id="25" name="Elipse 24">
+              <a:extLst>
+                <a:ext uri="{FF2B5EF4-FFF2-40B4-BE49-F238E27FC236}">
+                  <a16:creationId xmlns:a16="http://schemas.microsoft.com/office/drawing/2014/main" id="{08BAA954-D556-5DD8-61F5-E72FBEC511ED}"/>
+                </a:ext>
+              </a:extLst>
+            </p:cNvPr>
+            <p:cNvSpPr/>
+            <p:nvPr/>
+          </p:nvSpPr>
+          <p:spPr>
+            <a:xfrm>
+              <a:off x="4419600" y="1938505"/>
+              <a:ext cx="129540" cy="129540"/>
+            </a:xfrm>
+            <a:prstGeom prst="ellipse">
+              <a:avLst/>
+            </a:prstGeom>
+            <a:solidFill>
+              <a:schemeClr val="bg1"/>
+            </a:solidFill>
+            <a:ln>
+              <a:solidFill>
+                <a:schemeClr val="tx1"/>
+              </a:solidFill>
+            </a:ln>
+          </p:spPr>
+          <p:style>
+            <a:lnRef idx="2">
+              <a:schemeClr val="accent1">
+                <a:shade val="50000"/>
+              </a:schemeClr>
+            </a:lnRef>
+            <a:fillRef idx="1">
+              <a:schemeClr val="accent1"/>
+            </a:fillRef>
+            <a:effectRef idx="0">
+              <a:schemeClr val="accent1"/>
+            </a:effectRef>
+            <a:fontRef idx="minor">
+              <a:schemeClr val="lt1"/>
+            </a:fontRef>
+          </p:style>
+          <p:txBody>
+            <a:bodyPr rtlCol="0" anchor="ctr"/>
+            <a:lstStyle/>
+            <a:p>
+              <a:pPr algn="ctr"/>
+              <a:endParaRPr lang="pt-BR" dirty="0"/>
+            </a:p>
+          </p:txBody>
+        </p:sp>
+        <p:sp>
+          <p:nvSpPr>
+            <p:cNvPr id="27" name="CaixaDeTexto 26">
+              <a:extLst>
+                <a:ext uri="{FF2B5EF4-FFF2-40B4-BE49-F238E27FC236}">
+                  <a16:creationId xmlns:a16="http://schemas.microsoft.com/office/drawing/2014/main" id="{6006594D-2DEA-4D53-13B5-F813E8000E9C}"/>
+                </a:ext>
+              </a:extLst>
+            </p:cNvPr>
+            <p:cNvSpPr txBox="1"/>
+            <p:nvPr/>
+          </p:nvSpPr>
+          <p:spPr>
+            <a:xfrm>
+              <a:off x="4521249" y="1813546"/>
+              <a:ext cx="1340983" cy="369332"/>
+            </a:xfrm>
+            <a:prstGeom prst="rect">
+              <a:avLst/>
+            </a:prstGeom>
+            <a:noFill/>
+          </p:spPr>
+          <p:txBody>
+            <a:bodyPr wrap="square" rtlCol="0">
+              <a:spAutoFit/>
+            </a:bodyPr>
+            <a:lstStyle/>
+            <a:p>
+              <a:r>
+                <a:rPr lang="pt-BR" dirty="0"/>
+                <a:t>Decrescente</a:t>
+              </a:r>
+            </a:p>
+          </p:txBody>
+        </p:sp>
+      </p:grpSp>
+      <p:sp>
+        <p:nvSpPr>
+          <p:cNvPr id="6" name="Retângulo 5">
+            <a:extLst>
+              <a:ext uri="{FF2B5EF4-FFF2-40B4-BE49-F238E27FC236}">
+                <a16:creationId xmlns:a16="http://schemas.microsoft.com/office/drawing/2014/main" id="{2EECE6D4-24C4-A017-1D2C-BD7BBB96F331}"/>
+              </a:ext>
+            </a:extLst>
+          </p:cNvPr>
+          <p:cNvSpPr/>
+          <p:nvPr/>
+        </p:nvSpPr>
+        <p:spPr>
+          <a:xfrm>
+            <a:off x="7296150" y="1878966"/>
+            <a:ext cx="951704" cy="303912"/>
+          </a:xfrm>
+          <a:prstGeom prst="rect">
+            <a:avLst/>
+          </a:prstGeom>
+          <a:solidFill>
+            <a:schemeClr val="bg1">
+              <a:lumMod val="75000"/>
+            </a:schemeClr>
+          </a:solidFill>
+          <a:ln>
+            <a:noFill/>
+          </a:ln>
+          <a:effectLst/>
+          <a:scene3d>
+            <a:camera prst="orthographicFront">
+              <a:rot lat="0" lon="0" rev="0"/>
+            </a:camera>
+            <a:lightRig rig="chilly" dir="t">
+              <a:rot lat="0" lon="0" rev="18480000"/>
+            </a:lightRig>
+          </a:scene3d>
+          <a:sp3d prstMaterial="clear">
+            <a:bevelT h="63500"/>
+          </a:sp3d>
+        </p:spPr>
+        <p:style>
+          <a:lnRef idx="2">
+            <a:schemeClr val="accent1">
+              <a:shade val="50000"/>
+            </a:schemeClr>
+          </a:lnRef>
+          <a:fillRef idx="1">
+            <a:schemeClr val="accent1"/>
+          </a:fillRef>
+          <a:effectRef idx="0">
+            <a:schemeClr val="accent1"/>
+          </a:effectRef>
+          <a:fontRef idx="minor">
+            <a:schemeClr val="lt1"/>
+          </a:fontRef>
+        </p:style>
+        <p:txBody>
+          <a:bodyPr rtlCol="0" anchor="ctr"/>
+          <a:lstStyle/>
+          <a:p>
+            <a:pPr algn="ctr"/>
+            <a:r>
+              <a:rPr lang="pt-BR" sz="1400" dirty="0">
+                <a:ln>
+                  <a:solidFill>
+                    <a:sysClr val="windowText" lastClr="000000"/>
+                  </a:solidFill>
+                </a:ln>
+                <a:solidFill>
+                  <a:sysClr val="windowText" lastClr="000000"/>
+                </a:solidFill>
+              </a:rPr>
+              <a:t>Filtrar</a:t>
+            </a:r>
+            <a:endParaRPr lang="pt-BR" dirty="0">
+              <a:ln>
+                <a:solidFill>
+                  <a:sysClr val="windowText" lastClr="000000"/>
+                </a:solidFill>
+              </a:ln>
+              <a:solidFill>
+                <a:sysClr val="windowText" lastClr="000000"/>
+              </a:solidFill>
+            </a:endParaRPr>
+          </a:p>
+        </p:txBody>
+      </p:sp>
+    </p:spTree>
+    <p:extLst>
+      <p:ext uri="{BB962C8B-B14F-4D97-AF65-F5344CB8AC3E}">
+        <p14:creationId xmlns:p14="http://schemas.microsoft.com/office/powerpoint/2010/main" val="1018625385"/>
+      </p:ext>
+    </p:extLst>
+  </p:cSld>
+  <p:clrMapOvr>
+    <a:masterClrMapping/>
+  </p:clrMapOvr>
+</p:sld>
+</file>
+
 <file path=ppt/theme/theme1.xml><?xml version="1.0" encoding="utf-8"?>
 <a:theme xmlns:a="http://schemas.openxmlformats.org/drawingml/2006/main" name="Tema do Office">
   <a:themeElements>

</xml_diff>